<commit_message>
Revoir ROC, AUC & MAPE dans les slides
</commit_message>
<xml_diff>
--- a/05_supervised_ML/98_Project_Walmart/01_walmart_project.pptx
+++ b/05_supervised_ML/98_Project_Walmart/01_walmart_project.pptx
@@ -128,7 +128,7 @@
 <file path=ppt/revisionInfo.xml><?xml version="1.0" encoding="utf-8"?>
 <p1510:revInfo xmlns:a="http://schemas.openxmlformats.org/drawingml/2006/main" xmlns:r="http://schemas.openxmlformats.org/officeDocument/2006/relationships" xmlns:p1510="http://schemas.microsoft.com/office/powerpoint/2015/10/main">
   <p1510:revLst>
-    <p1510:client id="{E03E74EA-EF3B-43B4-9B17-52CA29A38D90}" v="9" dt="2024-08-24T09:45:33.846"/>
+    <p1510:client id="{E03E74EA-EF3B-43B4-9B17-52CA29A38D90}" v="11" dt="2024-08-27T09:45:54.130"/>
   </p1510:revLst>
 </p1510:revInfo>
 </file>
@@ -583,7 +583,7 @@
   <pc:docChgLst>
     <pc:chgData name="Philippe Baucour" userId="5102170ae7533958" providerId="LiveId" clId="{E03E74EA-EF3B-43B4-9B17-52CA29A38D90}"/>
     <pc:docChg chg="undo custSel addSld delSld modSld sldOrd">
-      <pc:chgData name="Philippe Baucour" userId="5102170ae7533958" providerId="LiveId" clId="{E03E74EA-EF3B-43B4-9B17-52CA29A38D90}" dt="2024-08-26T08:46:26.357" v="1478" actId="20577"/>
+      <pc:chgData name="Philippe Baucour" userId="5102170ae7533958" providerId="LiveId" clId="{E03E74EA-EF3B-43B4-9B17-52CA29A38D90}" dt="2024-08-27T09:59:57.761" v="1600" actId="14100"/>
       <pc:docMkLst>
         <pc:docMk/>
       </pc:docMkLst>
@@ -699,8 +699,8 @@
           </ac:spMkLst>
         </pc:spChg>
       </pc:sldChg>
-      <pc:sldChg chg="addSp delSp modSp new mod modClrScheme chgLayout">
-        <pc:chgData name="Philippe Baucour" userId="5102170ae7533958" providerId="LiveId" clId="{E03E74EA-EF3B-43B4-9B17-52CA29A38D90}" dt="2024-08-21T15:34:12.251" v="1343" actId="1076"/>
+      <pc:sldChg chg="addSp delSp modSp new mod modClrScheme chgLayout modNotesTx">
+        <pc:chgData name="Philippe Baucour" userId="5102170ae7533958" providerId="LiveId" clId="{E03E74EA-EF3B-43B4-9B17-52CA29A38D90}" dt="2024-08-27T09:59:57.761" v="1600" actId="14100"/>
         <pc:sldMkLst>
           <pc:docMk/>
           <pc:sldMk cId="2579142271" sldId="264"/>
@@ -721,22 +721,70 @@
             <ac:spMk id="3" creationId="{4C392BD8-8CFD-EED9-86DF-4237481A9E54}"/>
           </ac:spMkLst>
         </pc:spChg>
-        <pc:spChg chg="add mod">
-          <ac:chgData name="Philippe Baucour" userId="5102170ae7533958" providerId="LiveId" clId="{E03E74EA-EF3B-43B4-9B17-52CA29A38D90}" dt="2024-08-21T15:34:12.251" v="1343" actId="1076"/>
+        <pc:spChg chg="add mod ord">
+          <ac:chgData name="Philippe Baucour" userId="5102170ae7533958" providerId="LiveId" clId="{E03E74EA-EF3B-43B4-9B17-52CA29A38D90}" dt="2024-08-27T09:59:24.800" v="1591" actId="1076"/>
           <ac:spMkLst>
             <pc:docMk/>
             <pc:sldMk cId="2579142271" sldId="264"/>
             <ac:spMk id="6" creationId="{7E8F6498-297D-22A0-E804-B2C90C7599C8}"/>
           </ac:spMkLst>
         </pc:spChg>
-        <pc:picChg chg="add mod">
-          <ac:chgData name="Philippe Baucour" userId="5102170ae7533958" providerId="LiveId" clId="{E03E74EA-EF3B-43B4-9B17-52CA29A38D90}" dt="2024-08-21T14:29:53.193" v="56" actId="108"/>
+        <pc:spChg chg="add mod">
+          <ac:chgData name="Philippe Baucour" userId="5102170ae7533958" providerId="LiveId" clId="{E03E74EA-EF3B-43B4-9B17-52CA29A38D90}" dt="2024-08-27T09:59:13.071" v="1590" actId="14100"/>
+          <ac:spMkLst>
+            <pc:docMk/>
+            <pc:sldMk cId="2579142271" sldId="264"/>
+            <ac:spMk id="8" creationId="{CCC00B3E-FB86-EB9C-ACBB-EFC535D6DD59}"/>
+          </ac:spMkLst>
+        </pc:spChg>
+        <pc:spChg chg="add mod">
+          <ac:chgData name="Philippe Baucour" userId="5102170ae7533958" providerId="LiveId" clId="{E03E74EA-EF3B-43B4-9B17-52CA29A38D90}" dt="2024-08-27T09:59:57.761" v="1600" actId="14100"/>
+          <ac:spMkLst>
+            <pc:docMk/>
+            <pc:sldMk cId="2579142271" sldId="264"/>
+            <ac:spMk id="9" creationId="{EA45B84D-44C4-953E-A32C-9400F51C5234}"/>
+          </ac:spMkLst>
+        </pc:spChg>
+        <pc:spChg chg="add mod">
+          <ac:chgData name="Philippe Baucour" userId="5102170ae7533958" providerId="LiveId" clId="{E03E74EA-EF3B-43B4-9B17-52CA29A38D90}" dt="2024-08-27T09:59:40.884" v="1598" actId="14100"/>
+          <ac:spMkLst>
+            <pc:docMk/>
+            <pc:sldMk cId="2579142271" sldId="264"/>
+            <ac:spMk id="10" creationId="{B33CBB8E-3B91-7F0B-3C32-37400A0B5979}"/>
+          </ac:spMkLst>
+        </pc:spChg>
+        <pc:picChg chg="add del mod">
+          <ac:chgData name="Philippe Baucour" userId="5102170ae7533958" providerId="LiveId" clId="{E03E74EA-EF3B-43B4-9B17-52CA29A38D90}" dt="2024-08-27T09:41:03.325" v="1486" actId="478"/>
           <ac:picMkLst>
             <pc:docMk/>
             <pc:sldMk cId="2579142271" sldId="264"/>
             <ac:picMk id="5" creationId="{B18962DA-45C1-F7C1-922F-036B56732965}"/>
           </ac:picMkLst>
         </pc:picChg>
+        <pc:picChg chg="add del mod">
+          <ac:chgData name="Philippe Baucour" userId="5102170ae7533958" providerId="LiveId" clId="{E03E74EA-EF3B-43B4-9B17-52CA29A38D90}" dt="2024-08-27T09:58:58.305" v="1586" actId="478"/>
+          <ac:picMkLst>
+            <pc:docMk/>
+            <pc:sldMk cId="2579142271" sldId="264"/>
+            <ac:picMk id="7" creationId="{7E6FF671-590C-361F-2D42-1B9560FD430D}"/>
+          </ac:picMkLst>
+        </pc:picChg>
+        <pc:picChg chg="add ord">
+          <ac:chgData name="Philippe Baucour" userId="5102170ae7533958" providerId="LiveId" clId="{E03E74EA-EF3B-43B4-9B17-52CA29A38D90}" dt="2024-08-27T09:59:06.214" v="1588" actId="167"/>
+          <ac:picMkLst>
+            <pc:docMk/>
+            <pc:sldMk cId="2579142271" sldId="264"/>
+            <ac:picMk id="12" creationId="{F02719BF-22B5-F4FD-D1B7-F95B80E17B13}"/>
+          </ac:picMkLst>
+        </pc:picChg>
+        <pc:inkChg chg="add del">
+          <ac:chgData name="Philippe Baucour" userId="5102170ae7533958" providerId="LiveId" clId="{E03E74EA-EF3B-43B4-9B17-52CA29A38D90}" dt="2024-08-27T09:20:34.886" v="1483" actId="9405"/>
+          <ac:inkMkLst>
+            <pc:docMk/>
+            <pc:sldMk cId="2579142271" sldId="264"/>
+            <ac:inkMk id="3" creationId="{143828F3-B5F4-68B4-CA23-7F24FDB6D24D}"/>
+          </ac:inkMkLst>
+        </pc:inkChg>
       </pc:sldChg>
       <pc:sldChg chg="addSp modSp new mod modNotesTx">
         <pc:chgData name="Philippe Baucour" userId="5102170ae7533958" providerId="LiveId" clId="{E03E74EA-EF3B-43B4-9B17-52CA29A38D90}" dt="2024-08-26T07:54:31.082" v="1426" actId="20577"/>
@@ -2024,7 +2072,7 @@
           <a:p>
             <a:fld id="{FD1752CD-A7D2-4825-BC26-9DAEFBD0A5FF}" type="datetimeFigureOut">
               <a:rPr lang="fr-FR" smtClean="0"/>
-              <a:t>26/08/2024</a:t>
+              <a:t>27/08/2024</a:t>
             </a:fld>
             <a:endParaRPr lang="fr-FR"/>
           </a:p>
@@ -2748,70 +2796,30 @@
           <a:bodyPr/>
           <a:lstStyle/>
           <a:p>
-            <a:pPr marL="0" marR="0" lvl="0" indent="0" algn="l" defTabSz="914400" rtl="0" eaLnBrk="1" fontAlgn="auto" latinLnBrk="0" hangingPunct="1">
-              <a:lnSpc>
-                <a:spcPct val="100000"/>
-              </a:lnSpc>
-              <a:spcBef>
-                <a:spcPts val="0"/>
-              </a:spcBef>
-              <a:spcAft>
-                <a:spcPts val="0"/>
-              </a:spcAft>
-              <a:buClrTx/>
-              <a:buSzTx/>
-              <a:buFontTx/>
-              <a:buNone/>
-              <a:tabLst/>
-              <a:defRPr/>
-            </a:pPr>
-            <a:r>
-              <a:rPr lang="fr-FR" b="0" dirty="0">
-                <a:solidFill>
-                  <a:srgbClr val="CCCCCC"/>
-                </a:solidFill>
-                <a:effectLst/>
-                <a:highlight>
-                  <a:srgbClr val="1F1F1F"/>
-                </a:highlight>
-                <a:latin typeface="JetBrains Mono" panose="02000009000000000000" pitchFamily="49" charset="0"/>
-              </a:rPr>
-              <a:t>30 x Nb Features</a:t>
-            </a:r>
-          </a:p>
-          <a:p>
-            <a:pPr marL="0" marR="0" lvl="0" indent="0" algn="l" defTabSz="914400" rtl="0" eaLnBrk="1" fontAlgn="auto" latinLnBrk="0" hangingPunct="1">
-              <a:lnSpc>
-                <a:spcPct val="100000"/>
-              </a:lnSpc>
-              <a:spcBef>
-                <a:spcPts val="0"/>
-              </a:spcBef>
-              <a:spcAft>
-                <a:spcPts val="0"/>
-              </a:spcAft>
-              <a:buClrTx/>
-              <a:buSzTx/>
-              <a:buFontTx/>
-              <a:buNone/>
-              <a:tabLst/>
-              <a:defRPr/>
-            </a:pPr>
-            <a:r>
-              <a:rPr lang="fr-FR" b="0" dirty="0">
-                <a:solidFill>
-                  <a:srgbClr val="CCCCCC"/>
-                </a:solidFill>
-                <a:effectLst/>
-                <a:highlight>
-                  <a:srgbClr val="1F1F1F"/>
-                </a:highlight>
-                <a:latin typeface="JetBrains Mono" panose="02000009000000000000" pitchFamily="49" charset="0"/>
-              </a:rPr>
-              <a:t>CPI = Consumer Price Index</a:t>
-            </a:r>
-          </a:p>
-          <a:p>
+            <a:r>
+              <a:rPr lang="fr-FR" dirty="0"/>
+              <a:t>MAPE : </a:t>
+            </a:r>
+            <a:r>
+              <a:rPr lang="fr-FR" dirty="0" err="1"/>
+              <a:t>mean</a:t>
+            </a:r>
+            <a:r>
+              <a:rPr lang="fr-FR" dirty="0"/>
+              <a:t> </a:t>
+            </a:r>
+            <a:r>
+              <a:rPr lang="fr-FR" dirty="0" err="1"/>
+              <a:t>absolute</a:t>
+            </a:r>
+            <a:r>
+              <a:rPr lang="fr-FR" dirty="0"/>
+              <a:t> percentage </a:t>
+            </a:r>
+            <a:r>
+              <a:rPr lang="fr-FR" dirty="0" err="1"/>
+              <a:t>error</a:t>
+            </a:r>
             <a:endParaRPr lang="fr-FR" dirty="0"/>
           </a:p>
         </p:txBody>
@@ -2833,7 +2841,7 @@
           <a:p>
             <a:fld id="{341AEC00-4977-4C47-A11B-52155DC12F54}" type="slidenum">
               <a:rPr lang="fr-FR" smtClean="0"/>
-              <a:t>4</a:t>
+              <a:t>3</a:t>
             </a:fld>
             <a:endParaRPr lang="fr-FR"/>
           </a:p>
@@ -2842,7 +2850,7 @@
     </p:spTree>
     <p:extLst>
       <p:ext uri="{BB962C8B-B14F-4D97-AF65-F5344CB8AC3E}">
-        <p14:creationId xmlns:p14="http://schemas.microsoft.com/office/powerpoint/2010/main" val="1074835215"/>
+        <p14:creationId xmlns:p14="http://schemas.microsoft.com/office/powerpoint/2010/main" val="2202355901"/>
       </p:ext>
     </p:extLst>
   </p:cSld>
@@ -2924,6 +2932,154 @@
                 </a:highlight>
                 <a:latin typeface="JetBrains Mono" panose="02000009000000000000" pitchFamily="49" charset="0"/>
               </a:rPr>
+              <a:t>30 x Nb Features</a:t>
+            </a:r>
+          </a:p>
+          <a:p>
+            <a:pPr marL="0" marR="0" lvl="0" indent="0" algn="l" defTabSz="914400" rtl="0" eaLnBrk="1" fontAlgn="auto" latinLnBrk="0" hangingPunct="1">
+              <a:lnSpc>
+                <a:spcPct val="100000"/>
+              </a:lnSpc>
+              <a:spcBef>
+                <a:spcPts val="0"/>
+              </a:spcBef>
+              <a:spcAft>
+                <a:spcPts val="0"/>
+              </a:spcAft>
+              <a:buClrTx/>
+              <a:buSzTx/>
+              <a:buFontTx/>
+              <a:buNone/>
+              <a:tabLst/>
+              <a:defRPr/>
+            </a:pPr>
+            <a:r>
+              <a:rPr lang="fr-FR" b="0" dirty="0">
+                <a:solidFill>
+                  <a:srgbClr val="CCCCCC"/>
+                </a:solidFill>
+                <a:effectLst/>
+                <a:highlight>
+                  <a:srgbClr val="1F1F1F"/>
+                </a:highlight>
+                <a:latin typeface="JetBrains Mono" panose="02000009000000000000" pitchFamily="49" charset="0"/>
+              </a:rPr>
+              <a:t>CPI = Consumer Price Index</a:t>
+            </a:r>
+          </a:p>
+          <a:p>
+            <a:endParaRPr lang="fr-FR" dirty="0"/>
+          </a:p>
+        </p:txBody>
+      </p:sp>
+      <p:sp>
+        <p:nvSpPr>
+          <p:cNvPr id="4" name="Espace réservé du numéro de diapositive 3"/>
+          <p:cNvSpPr>
+            <a:spLocks noGrp="1"/>
+          </p:cNvSpPr>
+          <p:nvPr>
+            <p:ph type="sldNum" sz="quarter" idx="5"/>
+          </p:nvPr>
+        </p:nvSpPr>
+        <p:spPr/>
+        <p:txBody>
+          <a:bodyPr/>
+          <a:lstStyle/>
+          <a:p>
+            <a:fld id="{341AEC00-4977-4C47-A11B-52155DC12F54}" type="slidenum">
+              <a:rPr lang="fr-FR" smtClean="0"/>
+              <a:t>4</a:t>
+            </a:fld>
+            <a:endParaRPr lang="fr-FR"/>
+          </a:p>
+        </p:txBody>
+      </p:sp>
+    </p:spTree>
+    <p:extLst>
+      <p:ext uri="{BB962C8B-B14F-4D97-AF65-F5344CB8AC3E}">
+        <p14:creationId xmlns:p14="http://schemas.microsoft.com/office/powerpoint/2010/main" val="1074835215"/>
+      </p:ext>
+    </p:extLst>
+  </p:cSld>
+  <p:clrMapOvr>
+    <a:masterClrMapping/>
+  </p:clrMapOvr>
+</p:notes>
+</file>
+
+<file path=ppt/notesSlides/notesSlide4.xml><?xml version="1.0" encoding="utf-8"?>
+<p:notes xmlns:a="http://schemas.openxmlformats.org/drawingml/2006/main" xmlns:r="http://schemas.openxmlformats.org/officeDocument/2006/relationships" xmlns:p="http://schemas.openxmlformats.org/presentationml/2006/main">
+  <p:cSld>
+    <p:spTree>
+      <p:nvGrpSpPr>
+        <p:cNvPr id="1" name=""/>
+        <p:cNvGrpSpPr/>
+        <p:nvPr/>
+      </p:nvGrpSpPr>
+      <p:grpSpPr>
+        <a:xfrm>
+          <a:off x="0" y="0"/>
+          <a:ext cx="0" cy="0"/>
+          <a:chOff x="0" y="0"/>
+          <a:chExt cx="0" cy="0"/>
+        </a:xfrm>
+      </p:grpSpPr>
+      <p:sp>
+        <p:nvSpPr>
+          <p:cNvPr id="2" name="Espace réservé de l'image des diapositives 1"/>
+          <p:cNvSpPr>
+            <a:spLocks noGrp="1" noRot="1" noChangeAspect="1"/>
+          </p:cNvSpPr>
+          <p:nvPr>
+            <p:ph type="sldImg"/>
+          </p:nvPr>
+        </p:nvSpPr>
+        <p:spPr/>
+      </p:sp>
+      <p:sp>
+        <p:nvSpPr>
+          <p:cNvPr id="3" name="Espace réservé des notes 2"/>
+          <p:cNvSpPr>
+            <a:spLocks noGrp="1"/>
+          </p:cNvSpPr>
+          <p:nvPr>
+            <p:ph type="body" idx="1"/>
+          </p:nvPr>
+        </p:nvSpPr>
+        <p:spPr/>
+        <p:txBody>
+          <a:bodyPr/>
+          <a:lstStyle/>
+          <a:p>
+            <a:pPr marL="0" marR="0" lvl="0" indent="0" algn="l" defTabSz="914400" rtl="0" eaLnBrk="1" fontAlgn="auto" latinLnBrk="0" hangingPunct="1">
+              <a:lnSpc>
+                <a:spcPct val="100000"/>
+              </a:lnSpc>
+              <a:spcBef>
+                <a:spcPts val="0"/>
+              </a:spcBef>
+              <a:spcAft>
+                <a:spcPts val="0"/>
+              </a:spcAft>
+              <a:buClrTx/>
+              <a:buSzTx/>
+              <a:buFontTx/>
+              <a:buNone/>
+              <a:tabLst/>
+              <a:defRPr/>
+            </a:pPr>
+            <a:r>
+              <a:rPr lang="fr-FR" b="0" dirty="0">
+                <a:solidFill>
+                  <a:srgbClr val="CCCCCC"/>
+                </a:solidFill>
+                <a:effectLst/>
+                <a:highlight>
+                  <a:srgbClr val="1F1F1F"/>
+                </a:highlight>
+                <a:latin typeface="JetBrains Mono" panose="02000009000000000000" pitchFamily="49" charset="0"/>
+              </a:rPr>
               <a:t>Consumer Price Index</a:t>
             </a:r>
           </a:p>
@@ -2968,7 +3124,7 @@
 </p:notes>
 </file>
 
-<file path=ppt/notesSlides/notesSlide4.xml><?xml version="1.0" encoding="utf-8"?>
+<file path=ppt/notesSlides/notesSlide5.xml><?xml version="1.0" encoding="utf-8"?>
 <p:notes xmlns:a="http://schemas.openxmlformats.org/drawingml/2006/main" xmlns:r="http://schemas.openxmlformats.org/officeDocument/2006/relationships" xmlns:p="http://schemas.openxmlformats.org/presentationml/2006/main">
   <p:cSld>
     <p:spTree>
@@ -3281,7 +3437,7 @@
           <a:p>
             <a:fld id="{7ECB9D5A-E5E4-41FE-AF39-634902D6D5D2}" type="datetimeFigureOut">
               <a:rPr lang="fr-FR" smtClean="0"/>
-              <a:t>26/08/2024</a:t>
+              <a:t>27/08/2024</a:t>
             </a:fld>
             <a:endParaRPr lang="fr-FR"/>
           </a:p>
@@ -3479,7 +3635,7 @@
           <a:p>
             <a:fld id="{7ECB9D5A-E5E4-41FE-AF39-634902D6D5D2}" type="datetimeFigureOut">
               <a:rPr lang="fr-FR" smtClean="0"/>
-              <a:t>26/08/2024</a:t>
+              <a:t>27/08/2024</a:t>
             </a:fld>
             <a:endParaRPr lang="fr-FR"/>
           </a:p>
@@ -3687,7 +3843,7 @@
           <a:p>
             <a:fld id="{7ECB9D5A-E5E4-41FE-AF39-634902D6D5D2}" type="datetimeFigureOut">
               <a:rPr lang="fr-FR" smtClean="0"/>
-              <a:t>26/08/2024</a:t>
+              <a:t>27/08/2024</a:t>
             </a:fld>
             <a:endParaRPr lang="fr-FR"/>
           </a:p>
@@ -3885,7 +4041,7 @@
           <a:p>
             <a:fld id="{7ECB9D5A-E5E4-41FE-AF39-634902D6D5D2}" type="datetimeFigureOut">
               <a:rPr lang="fr-FR" smtClean="0"/>
-              <a:t>26/08/2024</a:t>
+              <a:t>27/08/2024</a:t>
             </a:fld>
             <a:endParaRPr lang="fr-FR"/>
           </a:p>
@@ -4160,7 +4316,7 @@
           <a:p>
             <a:fld id="{7ECB9D5A-E5E4-41FE-AF39-634902D6D5D2}" type="datetimeFigureOut">
               <a:rPr lang="fr-FR" smtClean="0"/>
-              <a:t>26/08/2024</a:t>
+              <a:t>27/08/2024</a:t>
             </a:fld>
             <a:endParaRPr lang="fr-FR"/>
           </a:p>
@@ -4425,7 +4581,7 @@
           <a:p>
             <a:fld id="{7ECB9D5A-E5E4-41FE-AF39-634902D6D5D2}" type="datetimeFigureOut">
               <a:rPr lang="fr-FR" smtClean="0"/>
-              <a:t>26/08/2024</a:t>
+              <a:t>27/08/2024</a:t>
             </a:fld>
             <a:endParaRPr lang="fr-FR"/>
           </a:p>
@@ -4837,7 +4993,7 @@
           <a:p>
             <a:fld id="{7ECB9D5A-E5E4-41FE-AF39-634902D6D5D2}" type="datetimeFigureOut">
               <a:rPr lang="fr-FR" smtClean="0"/>
-              <a:t>26/08/2024</a:t>
+              <a:t>27/08/2024</a:t>
             </a:fld>
             <a:endParaRPr lang="fr-FR"/>
           </a:p>
@@ -4978,7 +5134,7 @@
           <a:p>
             <a:fld id="{7ECB9D5A-E5E4-41FE-AF39-634902D6D5D2}" type="datetimeFigureOut">
               <a:rPr lang="fr-FR" smtClean="0"/>
-              <a:t>26/08/2024</a:t>
+              <a:t>27/08/2024</a:t>
             </a:fld>
             <a:endParaRPr lang="fr-FR"/>
           </a:p>
@@ -5091,7 +5247,7 @@
           <a:p>
             <a:fld id="{7ECB9D5A-E5E4-41FE-AF39-634902D6D5D2}" type="datetimeFigureOut">
               <a:rPr lang="fr-FR" smtClean="0"/>
-              <a:t>26/08/2024</a:t>
+              <a:t>27/08/2024</a:t>
             </a:fld>
             <a:endParaRPr lang="fr-FR"/>
           </a:p>
@@ -5402,7 +5558,7 @@
           <a:p>
             <a:fld id="{7ECB9D5A-E5E4-41FE-AF39-634902D6D5D2}" type="datetimeFigureOut">
               <a:rPr lang="fr-FR" smtClean="0"/>
-              <a:t>26/08/2024</a:t>
+              <a:t>27/08/2024</a:t>
             </a:fld>
             <a:endParaRPr lang="fr-FR"/>
           </a:p>
@@ -5693,7 +5849,7 @@
           <a:p>
             <a:fld id="{7ECB9D5A-E5E4-41FE-AF39-634902D6D5D2}" type="datetimeFigureOut">
               <a:rPr lang="fr-FR" smtClean="0"/>
-              <a:t>26/08/2024</a:t>
+              <a:t>27/08/2024</a:t>
             </a:fld>
             <a:endParaRPr lang="fr-FR"/>
           </a:p>
@@ -5934,7 +6090,7 @@
           <a:p>
             <a:fld id="{7ECB9D5A-E5E4-41FE-AF39-634902D6D5D2}" type="datetimeFigureOut">
               <a:rPr lang="fr-FR" smtClean="0"/>
-              <a:t>26/08/2024</a:t>
+              <a:t>27/08/2024</a:t>
             </a:fld>
             <a:endParaRPr lang="fr-FR"/>
           </a:p>
@@ -6845,49 +7001,12 @@
           <a:chExt cx="0" cy="0"/>
         </a:xfrm>
       </p:grpSpPr>
-      <p:sp>
-        <p:nvSpPr>
-          <p:cNvPr id="2" name="Titre 1">
-            <a:extLst>
-              <a:ext uri="{FF2B5EF4-FFF2-40B4-BE49-F238E27FC236}">
-                <a16:creationId xmlns:a16="http://schemas.microsoft.com/office/drawing/2014/main" id="{4B287CA5-239F-B3A2-82BA-F430DD31BD1A}"/>
-              </a:ext>
-            </a:extLst>
-          </p:cNvPr>
-          <p:cNvSpPr>
-            <a:spLocks noGrp="1"/>
-          </p:cNvSpPr>
-          <p:nvPr>
-            <p:ph type="title"/>
-          </p:nvPr>
-        </p:nvSpPr>
-        <p:spPr/>
-        <p:txBody>
-          <a:bodyPr/>
-          <a:lstStyle/>
-          <a:p>
-            <a:r>
-              <a:rPr lang="fr-FR" dirty="0" err="1"/>
-              <a:t>Executive</a:t>
-            </a:r>
-            <a:r>
-              <a:rPr lang="fr-FR" dirty="0"/>
-              <a:t> </a:t>
-            </a:r>
-            <a:r>
-              <a:rPr lang="fr-FR" dirty="0" err="1"/>
-              <a:t>summary</a:t>
-            </a:r>
-            <a:endParaRPr lang="fr-FR" dirty="0"/>
-          </a:p>
-        </p:txBody>
-      </p:sp>
       <p:pic>
         <p:nvPicPr>
-          <p:cNvPr id="5" name="Image 4">
-            <a:extLst>
-              <a:ext uri="{FF2B5EF4-FFF2-40B4-BE49-F238E27FC236}">
-                <a16:creationId xmlns:a16="http://schemas.microsoft.com/office/drawing/2014/main" id="{B18962DA-45C1-F7C1-922F-036B56732965}"/>
+          <p:cNvPr id="12" name="Image 11">
+            <a:extLst>
+              <a:ext uri="{FF2B5EF4-FFF2-40B4-BE49-F238E27FC236}">
+                <a16:creationId xmlns:a16="http://schemas.microsoft.com/office/drawing/2014/main" id="{F02719BF-22B5-F4FD-D1B7-F95B80E17B13}"/>
               </a:ext>
             </a:extLst>
           </p:cNvPr>
@@ -6897,30 +7016,60 @@
           <p:nvPr/>
         </p:nvPicPr>
         <p:blipFill>
-          <a:blip r:embed="rId2"/>
+          <a:blip r:embed="rId3"/>
           <a:stretch>
             <a:fillRect/>
           </a:stretch>
         </p:blipFill>
         <p:spPr>
-          <a:xfrm rot="21150357">
-            <a:off x="326372" y="2139650"/>
-            <a:ext cx="11539257" cy="2578699"/>
+          <a:xfrm>
+            <a:off x="0" y="1261690"/>
+            <a:ext cx="12192000" cy="4334619"/>
           </a:xfrm>
           <a:prstGeom prst="rect">
             <a:avLst/>
           </a:prstGeom>
-          <a:effectLst>
-            <a:outerShdw blurRad="50800" dist="38100" dir="2700000" algn="tl" rotWithShape="0">
-              <a:prstClr val="black">
-                <a:alpha val="40000"/>
-              </a:prstClr>
-            </a:outerShdw>
-          </a:effectLst>
         </p:spPr>
       </p:pic>
       <p:sp>
         <p:nvSpPr>
+          <p:cNvPr id="2" name="Titre 1">
+            <a:extLst>
+              <a:ext uri="{FF2B5EF4-FFF2-40B4-BE49-F238E27FC236}">
+                <a16:creationId xmlns:a16="http://schemas.microsoft.com/office/drawing/2014/main" id="{4B287CA5-239F-B3A2-82BA-F430DD31BD1A}"/>
+              </a:ext>
+            </a:extLst>
+          </p:cNvPr>
+          <p:cNvSpPr>
+            <a:spLocks noGrp="1"/>
+          </p:cNvSpPr>
+          <p:nvPr>
+            <p:ph type="title"/>
+          </p:nvPr>
+        </p:nvSpPr>
+        <p:spPr/>
+        <p:txBody>
+          <a:bodyPr/>
+          <a:lstStyle/>
+          <a:p>
+            <a:r>
+              <a:rPr lang="fr-FR" dirty="0" err="1"/>
+              <a:t>Executive</a:t>
+            </a:r>
+            <a:r>
+              <a:rPr lang="fr-FR" dirty="0"/>
+              <a:t> </a:t>
+            </a:r>
+            <a:r>
+              <a:rPr lang="fr-FR" dirty="0" err="1"/>
+              <a:t>summary</a:t>
+            </a:r>
+            <a:endParaRPr lang="fr-FR" dirty="0"/>
+          </a:p>
+        </p:txBody>
+      </p:sp>
+      <p:sp>
+        <p:nvSpPr>
           <p:cNvPr id="6" name="Flèche : haut 5">
             <a:extLst>
               <a:ext uri="{FF2B5EF4-FFF2-40B4-BE49-F238E27FC236}">
@@ -6932,8 +7081,8 @@
           <p:nvPr/>
         </p:nvSpPr>
         <p:spPr>
-          <a:xfrm rot="2468856">
-            <a:off x="362129" y="5062085"/>
+          <a:xfrm>
+            <a:off x="1458259" y="5553508"/>
             <a:ext cx="464127" cy="644236"/>
           </a:xfrm>
           <a:prstGeom prst="upArrow">
@@ -6954,6 +7103,168 @@
           </a:fillRef>
           <a:effectRef idx="0">
             <a:schemeClr val="accent1"/>
+          </a:effectRef>
+          <a:fontRef idx="minor">
+            <a:schemeClr val="lt1"/>
+          </a:fontRef>
+        </p:style>
+        <p:txBody>
+          <a:bodyPr rtlCol="0" anchor="ctr"/>
+          <a:lstStyle/>
+          <a:p>
+            <a:pPr algn="ctr"/>
+            <a:endParaRPr lang="fr-FR"/>
+          </a:p>
+        </p:txBody>
+      </p:sp>
+      <p:sp>
+        <p:nvSpPr>
+          <p:cNvPr id="8" name="Rectangle 7">
+            <a:extLst>
+              <a:ext uri="{FF2B5EF4-FFF2-40B4-BE49-F238E27FC236}">
+                <a16:creationId xmlns:a16="http://schemas.microsoft.com/office/drawing/2014/main" id="{CCC00B3E-FB86-EB9C-ACBB-EFC535D6DD59}"/>
+              </a:ext>
+            </a:extLst>
+          </p:cNvPr>
+          <p:cNvSpPr/>
+          <p:nvPr/>
+        </p:nvSpPr>
+        <p:spPr>
+          <a:xfrm>
+            <a:off x="1369797" y="2090185"/>
+            <a:ext cx="1105179" cy="203281"/>
+          </a:xfrm>
+          <a:prstGeom prst="rect">
+            <a:avLst/>
+          </a:prstGeom>
+          <a:solidFill>
+            <a:schemeClr val="accent4">
+              <a:alpha val="70000"/>
+            </a:schemeClr>
+          </a:solidFill>
+          <a:ln>
+            <a:noFill/>
+          </a:ln>
+        </p:spPr>
+        <p:style>
+          <a:lnRef idx="2">
+            <a:schemeClr val="accent4">
+              <a:shade val="15000"/>
+            </a:schemeClr>
+          </a:lnRef>
+          <a:fillRef idx="1">
+            <a:schemeClr val="accent4"/>
+          </a:fillRef>
+          <a:effectRef idx="0">
+            <a:schemeClr val="accent4"/>
+          </a:effectRef>
+          <a:fontRef idx="minor">
+            <a:schemeClr val="lt1"/>
+          </a:fontRef>
+        </p:style>
+        <p:txBody>
+          <a:bodyPr rtlCol="0" anchor="ctr"/>
+          <a:lstStyle/>
+          <a:p>
+            <a:pPr algn="ctr"/>
+            <a:endParaRPr lang="fr-FR"/>
+          </a:p>
+        </p:txBody>
+      </p:sp>
+      <p:sp>
+        <p:nvSpPr>
+          <p:cNvPr id="9" name="Rectangle 8">
+            <a:extLst>
+              <a:ext uri="{FF2B5EF4-FFF2-40B4-BE49-F238E27FC236}">
+                <a16:creationId xmlns:a16="http://schemas.microsoft.com/office/drawing/2014/main" id="{EA45B84D-44C4-953E-A32C-9400F51C5234}"/>
+              </a:ext>
+            </a:extLst>
+          </p:cNvPr>
+          <p:cNvSpPr/>
+          <p:nvPr/>
+        </p:nvSpPr>
+        <p:spPr>
+          <a:xfrm>
+            <a:off x="9426702" y="2988655"/>
+            <a:ext cx="2003298" cy="203281"/>
+          </a:xfrm>
+          <a:prstGeom prst="rect">
+            <a:avLst/>
+          </a:prstGeom>
+          <a:solidFill>
+            <a:schemeClr val="accent4">
+              <a:alpha val="70000"/>
+            </a:schemeClr>
+          </a:solidFill>
+          <a:ln>
+            <a:noFill/>
+          </a:ln>
+        </p:spPr>
+        <p:style>
+          <a:lnRef idx="2">
+            <a:schemeClr val="accent4">
+              <a:shade val="15000"/>
+            </a:schemeClr>
+          </a:lnRef>
+          <a:fillRef idx="1">
+            <a:schemeClr val="accent4"/>
+          </a:fillRef>
+          <a:effectRef idx="0">
+            <a:schemeClr val="accent4"/>
+          </a:effectRef>
+          <a:fontRef idx="minor">
+            <a:schemeClr val="lt1"/>
+          </a:fontRef>
+        </p:style>
+        <p:txBody>
+          <a:bodyPr rtlCol="0" anchor="ctr"/>
+          <a:lstStyle/>
+          <a:p>
+            <a:pPr algn="ctr"/>
+            <a:endParaRPr lang="fr-FR"/>
+          </a:p>
+        </p:txBody>
+      </p:sp>
+      <p:sp>
+        <p:nvSpPr>
+          <p:cNvPr id="10" name="Rectangle 9">
+            <a:extLst>
+              <a:ext uri="{FF2B5EF4-FFF2-40B4-BE49-F238E27FC236}">
+                <a16:creationId xmlns:a16="http://schemas.microsoft.com/office/drawing/2014/main" id="{B33CBB8E-3B91-7F0B-3C32-37400A0B5979}"/>
+              </a:ext>
+            </a:extLst>
+          </p:cNvPr>
+          <p:cNvSpPr/>
+          <p:nvPr/>
+        </p:nvSpPr>
+        <p:spPr>
+          <a:xfrm>
+            <a:off x="401300" y="2988656"/>
+            <a:ext cx="1792605" cy="203281"/>
+          </a:xfrm>
+          <a:prstGeom prst="rect">
+            <a:avLst/>
+          </a:prstGeom>
+          <a:solidFill>
+            <a:schemeClr val="accent4">
+              <a:alpha val="70000"/>
+            </a:schemeClr>
+          </a:solidFill>
+          <a:ln>
+            <a:noFill/>
+          </a:ln>
+        </p:spPr>
+        <p:style>
+          <a:lnRef idx="2">
+            <a:schemeClr val="accent4">
+              <a:shade val="15000"/>
+            </a:schemeClr>
+          </a:lnRef>
+          <a:fillRef idx="1">
+            <a:schemeClr val="accent4"/>
+          </a:fillRef>
+          <a:effectRef idx="0">
+            <a:schemeClr val="accent4"/>
           </a:effectRef>
           <a:fontRef idx="minor">
             <a:schemeClr val="lt1"/>

</xml_diff>

<commit_message>
Moins de slides visibles
</commit_message>
<xml_diff>
--- a/05_supervised_ML/98_Project_Walmart/01_walmart_project.pptx
+++ b/05_supervised_ML/98_Project_Walmart/01_walmart_project.pptx
@@ -583,7 +583,7 @@
   <pc:docChgLst>
     <pc:chgData name="Philippe Baucour" userId="5102170ae7533958" providerId="LiveId" clId="{E03E74EA-EF3B-43B4-9B17-52CA29A38D90}"/>
     <pc:docChg chg="undo custSel addSld delSld modSld sldOrd">
-      <pc:chgData name="Philippe Baucour" userId="5102170ae7533958" providerId="LiveId" clId="{E03E74EA-EF3B-43B4-9B17-52CA29A38D90}" dt="2024-08-27T09:59:57.761" v="1600" actId="14100"/>
+      <pc:chgData name="Philippe Baucour" userId="5102170ae7533958" providerId="LiveId" clId="{E03E74EA-EF3B-43B4-9B17-52CA29A38D90}" dt="2024-09-06T09:24:19.269" v="1618" actId="729"/>
       <pc:docMkLst>
         <pc:docMk/>
       </pc:docMkLst>
@@ -610,14 +610,14 @@
           </ac:spMkLst>
         </pc:spChg>
       </pc:sldChg>
-      <pc:sldChg chg="modSp mod">
-        <pc:chgData name="Philippe Baucour" userId="5102170ae7533958" providerId="LiveId" clId="{E03E74EA-EF3B-43B4-9B17-52CA29A38D90}" dt="2024-08-21T15:32:11.074" v="1335" actId="20577"/>
+      <pc:sldChg chg="modSp mod modNotesTx">
+        <pc:chgData name="Philippe Baucour" userId="5102170ae7533958" providerId="LiveId" clId="{E03E74EA-EF3B-43B4-9B17-52CA29A38D90}" dt="2024-09-06T09:22:57.180" v="1617" actId="6549"/>
         <pc:sldMkLst>
           <pc:docMk/>
           <pc:sldMk cId="3201622378" sldId="257"/>
         </pc:sldMkLst>
         <pc:spChg chg="mod">
-          <ac:chgData name="Philippe Baucour" userId="5102170ae7533958" providerId="LiveId" clId="{E03E74EA-EF3B-43B4-9B17-52CA29A38D90}" dt="2024-08-21T15:32:11.074" v="1335" actId="20577"/>
+          <ac:chgData name="Philippe Baucour" userId="5102170ae7533958" providerId="LiveId" clId="{E03E74EA-EF3B-43B4-9B17-52CA29A38D90}" dt="2024-09-06T09:22:57.180" v="1617" actId="6549"/>
           <ac:spMkLst>
             <pc:docMk/>
             <pc:sldMk cId="3201622378" sldId="257"/>
@@ -625,8 +625,8 @@
           </ac:spMkLst>
         </pc:spChg>
       </pc:sldChg>
-      <pc:sldChg chg="addSp delSp modSp mod modClrScheme chgLayout">
-        <pc:chgData name="Philippe Baucour" userId="5102170ae7533958" providerId="LiveId" clId="{E03E74EA-EF3B-43B4-9B17-52CA29A38D90}" dt="2024-08-21T15:33:11.673" v="1336" actId="700"/>
+      <pc:sldChg chg="addSp delSp modSp mod modClrScheme modShow chgLayout">
+        <pc:chgData name="Philippe Baucour" userId="5102170ae7533958" providerId="LiveId" clId="{E03E74EA-EF3B-43B4-9B17-52CA29A38D90}" dt="2024-09-06T09:16:28.231" v="1601" actId="729"/>
         <pc:sldMkLst>
           <pc:docMk/>
           <pc:sldMk cId="246086491" sldId="258"/>
@@ -684,8 +684,8 @@
           <pc:sldMk cId="2740920124" sldId="262"/>
         </pc:sldMkLst>
       </pc:sldChg>
-      <pc:sldChg chg="modSp mod ord">
-        <pc:chgData name="Philippe Baucour" userId="5102170ae7533958" providerId="LiveId" clId="{E03E74EA-EF3B-43B4-9B17-52CA29A38D90}" dt="2024-08-22T08:18:46.171" v="1404" actId="20577"/>
+      <pc:sldChg chg="modSp mod ord modShow">
+        <pc:chgData name="Philippe Baucour" userId="5102170ae7533958" providerId="LiveId" clId="{E03E74EA-EF3B-43B4-9B17-52CA29A38D90}" dt="2024-09-06T09:16:39.937" v="1602" actId="729"/>
         <pc:sldMkLst>
           <pc:docMk/>
           <pc:sldMk cId="312535264" sldId="263"/>
@@ -787,7 +787,7 @@
         </pc:inkChg>
       </pc:sldChg>
       <pc:sldChg chg="addSp modSp new mod modNotesTx">
-        <pc:chgData name="Philippe Baucour" userId="5102170ae7533958" providerId="LiveId" clId="{E03E74EA-EF3B-43B4-9B17-52CA29A38D90}" dt="2024-08-26T07:54:31.082" v="1426" actId="20577"/>
+        <pc:chgData name="Philippe Baucour" userId="5102170ae7533958" providerId="LiveId" clId="{E03E74EA-EF3B-43B4-9B17-52CA29A38D90}" dt="2024-09-06T09:21:27.730" v="1608" actId="20577"/>
         <pc:sldMkLst>
           <pc:docMk/>
           <pc:sldMk cId="350957286" sldId="265"/>
@@ -801,7 +801,7 @@
           </ac:spMkLst>
         </pc:spChg>
         <pc:spChg chg="mod">
-          <ac:chgData name="Philippe Baucour" userId="5102170ae7533958" providerId="LiveId" clId="{E03E74EA-EF3B-43B4-9B17-52CA29A38D90}" dt="2024-08-21T15:34:29.320" v="1349" actId="20577"/>
+          <ac:chgData name="Philippe Baucour" userId="5102170ae7533958" providerId="LiveId" clId="{E03E74EA-EF3B-43B4-9B17-52CA29A38D90}" dt="2024-09-06T09:21:27.730" v="1608" actId="20577"/>
           <ac:spMkLst>
             <pc:docMk/>
             <pc:sldMk cId="350957286" sldId="265"/>
@@ -958,8 +958,8 @@
           </ac:picMkLst>
         </pc:picChg>
       </pc:sldChg>
-      <pc:sldChg chg="addSp delSp modSp new mod chgLayout modNotesTx">
-        <pc:chgData name="Philippe Baucour" userId="5102170ae7533958" providerId="LiveId" clId="{E03E74EA-EF3B-43B4-9B17-52CA29A38D90}" dt="2024-08-21T15:01:05.728" v="507" actId="108"/>
+      <pc:sldChg chg="addSp delSp modSp new mod modShow chgLayout modNotesTx">
+        <pc:chgData name="Philippe Baucour" userId="5102170ae7533958" providerId="LiveId" clId="{E03E74EA-EF3B-43B4-9B17-52CA29A38D90}" dt="2024-09-06T09:24:19.269" v="1618" actId="729"/>
         <pc:sldMkLst>
           <pc:docMk/>
           <pc:sldMk cId="2537983697" sldId="269"/>
@@ -2072,7 +2072,7 @@
           <a:p>
             <a:fld id="{FD1752CD-A7D2-4825-BC26-9DAEFBD0A5FF}" type="datetimeFigureOut">
               <a:rPr lang="fr-FR" smtClean="0"/>
-              <a:t>27/08/2024</a:t>
+              <a:t>06/09/2024</a:t>
             </a:fld>
             <a:endParaRPr lang="fr-FR"/>
           </a:p>
@@ -3290,6 +3290,138 @@
 </p:notes>
 </file>
 
+<file path=ppt/notesSlides/notesSlide6.xml><?xml version="1.0" encoding="utf-8"?>
+<p:notes xmlns:a="http://schemas.openxmlformats.org/drawingml/2006/main" xmlns:r="http://schemas.openxmlformats.org/officeDocument/2006/relationships" xmlns:p="http://schemas.openxmlformats.org/presentationml/2006/main">
+  <p:cSld>
+    <p:spTree>
+      <p:nvGrpSpPr>
+        <p:cNvPr id="1" name=""/>
+        <p:cNvGrpSpPr/>
+        <p:nvPr/>
+      </p:nvGrpSpPr>
+      <p:grpSpPr>
+        <a:xfrm>
+          <a:off x="0" y="0"/>
+          <a:ext cx="0" cy="0"/>
+          <a:chOff x="0" y="0"/>
+          <a:chExt cx="0" cy="0"/>
+        </a:xfrm>
+      </p:grpSpPr>
+      <p:sp>
+        <p:nvSpPr>
+          <p:cNvPr id="2" name="Espace réservé de l'image des diapositives 1"/>
+          <p:cNvSpPr>
+            <a:spLocks noGrp="1" noRot="1" noChangeAspect="1"/>
+          </p:cNvSpPr>
+          <p:nvPr>
+            <p:ph type="sldImg"/>
+          </p:nvPr>
+        </p:nvSpPr>
+        <p:spPr/>
+      </p:sp>
+      <p:sp>
+        <p:nvSpPr>
+          <p:cNvPr id="3" name="Espace réservé des notes 2"/>
+          <p:cNvSpPr>
+            <a:spLocks noGrp="1"/>
+          </p:cNvSpPr>
+          <p:nvPr>
+            <p:ph type="body" idx="1"/>
+          </p:nvPr>
+        </p:nvSpPr>
+        <p:spPr/>
+        <p:txBody>
+          <a:bodyPr/>
+          <a:lstStyle/>
+          <a:p>
+            <a:r>
+              <a:rPr lang="en-US" dirty="0"/>
+              <a:t>EDA                     	: The recipe</a:t>
+            </a:r>
+          </a:p>
+          <a:p>
+            <a:r>
+              <a:rPr lang="en-US" dirty="0"/>
+              <a:t>Features Engineering	: The secret sauce</a:t>
+            </a:r>
+          </a:p>
+          <a:p>
+            <a:r>
+              <a:rPr lang="en-US" dirty="0"/>
+              <a:t>Baseline model          	: The first taste</a:t>
+            </a:r>
+          </a:p>
+          <a:p>
+            <a:r>
+              <a:rPr lang="en-US" dirty="0"/>
+              <a:t>Interpreting results    	: The tasting notes</a:t>
+            </a:r>
+          </a:p>
+          <a:p>
+            <a:endParaRPr lang="en-US" dirty="0"/>
+          </a:p>
+          <a:p>
+            <a:r>
+              <a:rPr lang="en-US" dirty="0"/>
+              <a:t>Don't mess with EDA     	: Never!</a:t>
+            </a:r>
+          </a:p>
+          <a:p>
+            <a:r>
+              <a:rPr lang="en-US" dirty="0"/>
+              <a:t>Feature engineering	: Smart!</a:t>
+            </a:r>
+          </a:p>
+          <a:p>
+            <a:r>
+              <a:rPr lang="en-US" dirty="0"/>
+              <a:t>Get a baseline model    	: Fast!</a:t>
+            </a:r>
+          </a:p>
+          <a:p>
+            <a:r>
+              <a:rPr lang="en-US" dirty="0"/>
+              <a:t>Results analysis        	: Always! </a:t>
+            </a:r>
+          </a:p>
+        </p:txBody>
+      </p:sp>
+      <p:sp>
+        <p:nvSpPr>
+          <p:cNvPr id="4" name="Espace réservé du numéro de diapositive 3"/>
+          <p:cNvSpPr>
+            <a:spLocks noGrp="1"/>
+          </p:cNvSpPr>
+          <p:nvPr>
+            <p:ph type="sldNum" sz="quarter" idx="5"/>
+          </p:nvPr>
+        </p:nvSpPr>
+        <p:spPr/>
+        <p:txBody>
+          <a:bodyPr/>
+          <a:lstStyle/>
+          <a:p>
+            <a:fld id="{341AEC00-4977-4C47-A11B-52155DC12F54}" type="slidenum">
+              <a:rPr lang="fr-FR" smtClean="0"/>
+              <a:t>10</a:t>
+            </a:fld>
+            <a:endParaRPr lang="fr-FR"/>
+          </a:p>
+        </p:txBody>
+      </p:sp>
+    </p:spTree>
+    <p:extLst>
+      <p:ext uri="{BB962C8B-B14F-4D97-AF65-F5344CB8AC3E}">
+        <p14:creationId xmlns:p14="http://schemas.microsoft.com/office/powerpoint/2010/main" val="1042600952"/>
+      </p:ext>
+    </p:extLst>
+  </p:cSld>
+  <p:clrMapOvr>
+    <a:masterClrMapping/>
+  </p:clrMapOvr>
+</p:notes>
+</file>
+
 <file path=ppt/slideLayouts/slideLayout1.xml><?xml version="1.0" encoding="utf-8"?>
 <p:sldLayout xmlns:a="http://schemas.openxmlformats.org/drawingml/2006/main" xmlns:r="http://schemas.openxmlformats.org/officeDocument/2006/relationships" xmlns:p="http://schemas.openxmlformats.org/presentationml/2006/main" type="title" preserve="1">
   <p:cSld name="Diapositive de titre">
@@ -3437,7 +3569,7 @@
           <a:p>
             <a:fld id="{7ECB9D5A-E5E4-41FE-AF39-634902D6D5D2}" type="datetimeFigureOut">
               <a:rPr lang="fr-FR" smtClean="0"/>
-              <a:t>27/08/2024</a:t>
+              <a:t>06/09/2024</a:t>
             </a:fld>
             <a:endParaRPr lang="fr-FR"/>
           </a:p>
@@ -3635,7 +3767,7 @@
           <a:p>
             <a:fld id="{7ECB9D5A-E5E4-41FE-AF39-634902D6D5D2}" type="datetimeFigureOut">
               <a:rPr lang="fr-FR" smtClean="0"/>
-              <a:t>27/08/2024</a:t>
+              <a:t>06/09/2024</a:t>
             </a:fld>
             <a:endParaRPr lang="fr-FR"/>
           </a:p>
@@ -3843,7 +3975,7 @@
           <a:p>
             <a:fld id="{7ECB9D5A-E5E4-41FE-AF39-634902D6D5D2}" type="datetimeFigureOut">
               <a:rPr lang="fr-FR" smtClean="0"/>
-              <a:t>27/08/2024</a:t>
+              <a:t>06/09/2024</a:t>
             </a:fld>
             <a:endParaRPr lang="fr-FR"/>
           </a:p>
@@ -4041,7 +4173,7 @@
           <a:p>
             <a:fld id="{7ECB9D5A-E5E4-41FE-AF39-634902D6D5D2}" type="datetimeFigureOut">
               <a:rPr lang="fr-FR" smtClean="0"/>
-              <a:t>27/08/2024</a:t>
+              <a:t>06/09/2024</a:t>
             </a:fld>
             <a:endParaRPr lang="fr-FR"/>
           </a:p>
@@ -4316,7 +4448,7 @@
           <a:p>
             <a:fld id="{7ECB9D5A-E5E4-41FE-AF39-634902D6D5D2}" type="datetimeFigureOut">
               <a:rPr lang="fr-FR" smtClean="0"/>
-              <a:t>27/08/2024</a:t>
+              <a:t>06/09/2024</a:t>
             </a:fld>
             <a:endParaRPr lang="fr-FR"/>
           </a:p>
@@ -4581,7 +4713,7 @@
           <a:p>
             <a:fld id="{7ECB9D5A-E5E4-41FE-AF39-634902D6D5D2}" type="datetimeFigureOut">
               <a:rPr lang="fr-FR" smtClean="0"/>
-              <a:t>27/08/2024</a:t>
+              <a:t>06/09/2024</a:t>
             </a:fld>
             <a:endParaRPr lang="fr-FR"/>
           </a:p>
@@ -4993,7 +5125,7 @@
           <a:p>
             <a:fld id="{7ECB9D5A-E5E4-41FE-AF39-634902D6D5D2}" type="datetimeFigureOut">
               <a:rPr lang="fr-FR" smtClean="0"/>
-              <a:t>27/08/2024</a:t>
+              <a:t>06/09/2024</a:t>
             </a:fld>
             <a:endParaRPr lang="fr-FR"/>
           </a:p>
@@ -5134,7 +5266,7 @@
           <a:p>
             <a:fld id="{7ECB9D5A-E5E4-41FE-AF39-634902D6D5D2}" type="datetimeFigureOut">
               <a:rPr lang="fr-FR" smtClean="0"/>
-              <a:t>27/08/2024</a:t>
+              <a:t>06/09/2024</a:t>
             </a:fld>
             <a:endParaRPr lang="fr-FR"/>
           </a:p>
@@ -5247,7 +5379,7 @@
           <a:p>
             <a:fld id="{7ECB9D5A-E5E4-41FE-AF39-634902D6D5D2}" type="datetimeFigureOut">
               <a:rPr lang="fr-FR" smtClean="0"/>
-              <a:t>27/08/2024</a:t>
+              <a:t>06/09/2024</a:t>
             </a:fld>
             <a:endParaRPr lang="fr-FR"/>
           </a:p>
@@ -5558,7 +5690,7 @@
           <a:p>
             <a:fld id="{7ECB9D5A-E5E4-41FE-AF39-634902D6D5D2}" type="datetimeFigureOut">
               <a:rPr lang="fr-FR" smtClean="0"/>
-              <a:t>27/08/2024</a:t>
+              <a:t>06/09/2024</a:t>
             </a:fld>
             <a:endParaRPr lang="fr-FR"/>
           </a:p>
@@ -5849,7 +5981,7 @@
           <a:p>
             <a:fld id="{7ECB9D5A-E5E4-41FE-AF39-634902D6D5D2}" type="datetimeFigureOut">
               <a:rPr lang="fr-FR" smtClean="0"/>
-              <a:t>27/08/2024</a:t>
+              <a:t>06/09/2024</a:t>
             </a:fld>
             <a:endParaRPr lang="fr-FR"/>
           </a:p>
@@ -6090,7 +6222,7 @@
           <a:p>
             <a:fld id="{7ECB9D5A-E5E4-41FE-AF39-634902D6D5D2}" type="datetimeFigureOut">
               <a:rPr lang="fr-FR" smtClean="0"/>
-              <a:t>27/08/2024</a:t>
+              <a:t>06/09/2024</a:t>
             </a:fld>
             <a:endParaRPr lang="fr-FR"/>
           </a:p>
@@ -6740,15 +6872,7 @@
           <a:p>
             <a:r>
               <a:rPr lang="en-US" dirty="0"/>
-              <a:t>We were able to use the exact same </a:t>
-            </a:r>
-            <a:r>
-              <a:rPr lang="en-US" dirty="0" err="1"/>
-              <a:t>pipeling</a:t>
-            </a:r>
-            <a:r>
-              <a:rPr lang="en-US" dirty="0"/>
-              <a:t> to training and test datasets</a:t>
+              <a:t>We were able to use the exact same pipeline for training and test datasets</a:t>
             </a:r>
           </a:p>
           <a:p>
@@ -6799,7 +6923,7 @@
 </file>
 
 <file path=ppt/slides/slide11.xml><?xml version="1.0" encoding="utf-8"?>
-<p:sld xmlns:a="http://schemas.openxmlformats.org/drawingml/2006/main" xmlns:r="http://schemas.openxmlformats.org/officeDocument/2006/relationships" xmlns:p="http://schemas.openxmlformats.org/presentationml/2006/main">
+<p:sld xmlns:a="http://schemas.openxmlformats.org/drawingml/2006/main" xmlns:r="http://schemas.openxmlformats.org/officeDocument/2006/relationships" xmlns:p="http://schemas.openxmlformats.org/presentationml/2006/main" show="0">
   <p:cSld>
     <p:spTree>
       <p:nvGrpSpPr>
@@ -6889,7 +7013,7 @@
 </file>
 
 <file path=ppt/slides/slide2.xml><?xml version="1.0" encoding="utf-8"?>
-<p:sld xmlns:a="http://schemas.openxmlformats.org/drawingml/2006/main" xmlns:r="http://schemas.openxmlformats.org/officeDocument/2006/relationships" xmlns:p="http://schemas.openxmlformats.org/presentationml/2006/main">
+<p:sld xmlns:a="http://schemas.openxmlformats.org/drawingml/2006/main" xmlns:r="http://schemas.openxmlformats.org/officeDocument/2006/relationships" xmlns:p="http://schemas.openxmlformats.org/presentationml/2006/main" show="0">
   <p:cSld>
     <p:spTree>
       <p:nvGrpSpPr>
@@ -7373,7 +7497,7 @@
           <a:p>
             <a:r>
               <a:rPr lang="fr-FR" dirty="0"/>
-              <a:t>the target </a:t>
+              <a:t>The target </a:t>
             </a:r>
             <a:r>
               <a:rPr lang="fr-FR" dirty="0" err="1"/>
@@ -7495,7 +7619,7 @@
 </file>
 
 <file path=ppt/slides/slide5.xml><?xml version="1.0" encoding="utf-8"?>
-<p:sld xmlns:a="http://schemas.openxmlformats.org/drawingml/2006/main" xmlns:r="http://schemas.openxmlformats.org/officeDocument/2006/relationships" xmlns:p="http://schemas.openxmlformats.org/presentationml/2006/main">
+<p:sld xmlns:a="http://schemas.openxmlformats.org/drawingml/2006/main" xmlns:r="http://schemas.openxmlformats.org/officeDocument/2006/relationships" xmlns:p="http://schemas.openxmlformats.org/presentationml/2006/main" show="0">
   <p:cSld>
     <p:spTree>
       <p:nvGrpSpPr>

</xml_diff>

<commit_message>
Slides review. Add the cross light
</commit_message>
<xml_diff>
--- a/05_supervised_ML/98_Project_Walmart/01_walmart_project.pptx
+++ b/05_supervised_ML/98_Project_Walmart/01_walmart_project.pptx
@@ -128,7 +128,7 @@
 <file path=ppt/revisionInfo.xml><?xml version="1.0" encoding="utf-8"?>
 <p1510:revInfo xmlns:a="http://schemas.openxmlformats.org/drawingml/2006/main" xmlns:r="http://schemas.openxmlformats.org/officeDocument/2006/relationships" xmlns:p1510="http://schemas.microsoft.com/office/powerpoint/2015/10/main">
   <p1510:revLst>
-    <p1510:client id="{E03E74EA-EF3B-43B4-9B17-52CA29A38D90}" v="12" dt="2024-09-17T06:41:02.561"/>
+    <p1510:client id="{E03E74EA-EF3B-43B4-9B17-52CA29A38D90}" v="16" dt="2024-09-17T14:19:54.486"/>
   </p1510:revLst>
 </p1510:revInfo>
 </file>
@@ -583,7 +583,7 @@
   <pc:docChgLst>
     <pc:chgData name="Philippe Baucour" userId="5102170ae7533958" providerId="LiveId" clId="{E03E74EA-EF3B-43B4-9B17-52CA29A38D90}"/>
     <pc:docChg chg="undo custSel addSld delSld modSld sldOrd">
-      <pc:chgData name="Philippe Baucour" userId="5102170ae7533958" providerId="LiveId" clId="{E03E74EA-EF3B-43B4-9B17-52CA29A38D90}" dt="2024-09-17T06:45:06.650" v="1737"/>
+      <pc:chgData name="Philippe Baucour" userId="5102170ae7533958" providerId="LiveId" clId="{E03E74EA-EF3B-43B4-9B17-52CA29A38D90}" dt="2024-09-17T14:53:30.962" v="2265"/>
       <pc:docMkLst>
         <pc:docMk/>
       </pc:docMkLst>
@@ -610,8 +610,8 @@
           </ac:spMkLst>
         </pc:spChg>
       </pc:sldChg>
-      <pc:sldChg chg="addSp modSp mod modNotesTx">
-        <pc:chgData name="Philippe Baucour" userId="5102170ae7533958" providerId="LiveId" clId="{E03E74EA-EF3B-43B4-9B17-52CA29A38D90}" dt="2024-09-17T06:45:06.650" v="1737"/>
+      <pc:sldChg chg="addSp modSp mod modAnim modNotesTx">
+        <pc:chgData name="Philippe Baucour" userId="5102170ae7533958" providerId="LiveId" clId="{E03E74EA-EF3B-43B4-9B17-52CA29A38D90}" dt="2024-09-17T13:40:34.789" v="1758" actId="207"/>
         <pc:sldMkLst>
           <pc:docMk/>
           <pc:sldMk cId="3201622378" sldId="257"/>
@@ -632,6 +632,54 @@
             <ac:spMk id="4" creationId="{1CB0633A-7E79-7F40-25D1-114C6B1444C7}"/>
           </ac:spMkLst>
         </pc:spChg>
+        <pc:spChg chg="mod">
+          <ac:chgData name="Philippe Baucour" userId="5102170ae7533958" providerId="LiveId" clId="{E03E74EA-EF3B-43B4-9B17-52CA29A38D90}" dt="2024-09-17T13:39:43.981" v="1756" actId="207"/>
+          <ac:spMkLst>
+            <pc:docMk/>
+            <pc:sldMk cId="3201622378" sldId="257"/>
+            <ac:spMk id="6" creationId="{452CC63D-3BBA-3175-4D69-47738F3F29AD}"/>
+          </ac:spMkLst>
+        </pc:spChg>
+        <pc:spChg chg="mod">
+          <ac:chgData name="Philippe Baucour" userId="5102170ae7533958" providerId="LiveId" clId="{E03E74EA-EF3B-43B4-9B17-52CA29A38D90}" dt="2024-09-17T13:36:04.426" v="1754"/>
+          <ac:spMkLst>
+            <pc:docMk/>
+            <pc:sldMk cId="3201622378" sldId="257"/>
+            <ac:spMk id="7" creationId="{CD3A35DC-88D7-A3EF-FBF7-FE5B87B742A8}"/>
+          </ac:spMkLst>
+        </pc:spChg>
+        <pc:spChg chg="mod">
+          <ac:chgData name="Philippe Baucour" userId="5102170ae7533958" providerId="LiveId" clId="{E03E74EA-EF3B-43B4-9B17-52CA29A38D90}" dt="2024-09-17T13:40:19.198" v="1757" actId="207"/>
+          <ac:spMkLst>
+            <pc:docMk/>
+            <pc:sldMk cId="3201622378" sldId="257"/>
+            <ac:spMk id="8" creationId="{CF0F7D9C-9002-475C-F827-83C1E0CE8EA9}"/>
+          </ac:spMkLst>
+        </pc:spChg>
+        <pc:spChg chg="mod">
+          <ac:chgData name="Philippe Baucour" userId="5102170ae7533958" providerId="LiveId" clId="{E03E74EA-EF3B-43B4-9B17-52CA29A38D90}" dt="2024-09-17T13:36:04.426" v="1754"/>
+          <ac:spMkLst>
+            <pc:docMk/>
+            <pc:sldMk cId="3201622378" sldId="257"/>
+            <ac:spMk id="9" creationId="{01D4FDA3-B3CF-D582-0365-F10997D76625}"/>
+          </ac:spMkLst>
+        </pc:spChg>
+        <pc:spChg chg="mod">
+          <ac:chgData name="Philippe Baucour" userId="5102170ae7533958" providerId="LiveId" clId="{E03E74EA-EF3B-43B4-9B17-52CA29A38D90}" dt="2024-09-17T13:40:34.789" v="1758" actId="207"/>
+          <ac:spMkLst>
+            <pc:docMk/>
+            <pc:sldMk cId="3201622378" sldId="257"/>
+            <ac:spMk id="10" creationId="{725E149A-555C-6062-2656-24AECCCC0790}"/>
+          </ac:spMkLst>
+        </pc:spChg>
+        <pc:grpChg chg="add mod">
+          <ac:chgData name="Philippe Baucour" userId="5102170ae7533958" providerId="LiveId" clId="{E03E74EA-EF3B-43B4-9B17-52CA29A38D90}" dt="2024-09-17T13:36:11.288" v="1755" actId="1076"/>
+          <ac:grpSpMkLst>
+            <pc:docMk/>
+            <pc:sldMk cId="3201622378" sldId="257"/>
+            <ac:grpSpMk id="5" creationId="{1F7DA58F-CACE-B4F2-936D-0C00F91DDAD5}"/>
+          </ac:grpSpMkLst>
+        </pc:grpChg>
       </pc:sldChg>
       <pc:sldChg chg="addSp delSp modSp mod modClrScheme modShow chgLayout">
         <pc:chgData name="Philippe Baucour" userId="5102170ae7533958" providerId="LiveId" clId="{E03E74EA-EF3B-43B4-9B17-52CA29A38D90}" dt="2024-09-06T09:16:28.231" v="1601" actId="729"/>
@@ -708,7 +756,7 @@
         </pc:spChg>
       </pc:sldChg>
       <pc:sldChg chg="addSp delSp modSp new mod modClrScheme chgLayout modNotesTx">
-        <pc:chgData name="Philippe Baucour" userId="5102170ae7533958" providerId="LiveId" clId="{E03E74EA-EF3B-43B4-9B17-52CA29A38D90}" dt="2024-08-27T09:59:57.761" v="1600" actId="14100"/>
+        <pc:chgData name="Philippe Baucour" userId="5102170ae7533958" providerId="LiveId" clId="{E03E74EA-EF3B-43B4-9B17-52CA29A38D90}" dt="2024-09-17T09:44:42.399" v="1752" actId="1036"/>
         <pc:sldMkLst>
           <pc:docMk/>
           <pc:sldMk cId="2579142271" sldId="264"/>
@@ -729,8 +777,16 @@
             <ac:spMk id="3" creationId="{4C392BD8-8CFD-EED9-86DF-4237481A9E54}"/>
           </ac:spMkLst>
         </pc:spChg>
+        <pc:spChg chg="add mod">
+          <ac:chgData name="Philippe Baucour" userId="5102170ae7533958" providerId="LiveId" clId="{E03E74EA-EF3B-43B4-9B17-52CA29A38D90}" dt="2024-09-17T09:44:29.356" v="1746" actId="207"/>
+          <ac:spMkLst>
+            <pc:docMk/>
+            <pc:sldMk cId="2579142271" sldId="264"/>
+            <ac:spMk id="3" creationId="{68AC9EB8-470B-F4C1-C0DE-08DE401A91F7}"/>
+          </ac:spMkLst>
+        </pc:spChg>
         <pc:spChg chg="add mod ord">
-          <ac:chgData name="Philippe Baucour" userId="5102170ae7533958" providerId="LiveId" clId="{E03E74EA-EF3B-43B4-9B17-52CA29A38D90}" dt="2024-08-27T09:59:24.800" v="1591" actId="1076"/>
+          <ac:chgData name="Philippe Baucour" userId="5102170ae7533958" providerId="LiveId" clId="{E03E74EA-EF3B-43B4-9B17-52CA29A38D90}" dt="2024-09-17T09:44:42.399" v="1752" actId="1036"/>
           <ac:spMkLst>
             <pc:docMk/>
             <pc:sldMk cId="2579142271" sldId="264"/>
@@ -826,7 +882,7 @@
         </pc:picChg>
       </pc:sldChg>
       <pc:sldChg chg="addSp delSp modSp new mod modClrScheme chgLayout">
-        <pc:chgData name="Philippe Baucour" userId="5102170ae7533958" providerId="LiveId" clId="{E03E74EA-EF3B-43B4-9B17-52CA29A38D90}" dt="2024-08-21T15:34:56.106" v="1350" actId="700"/>
+        <pc:chgData name="Philippe Baucour" userId="5102170ae7533958" providerId="LiveId" clId="{E03E74EA-EF3B-43B4-9B17-52CA29A38D90}" dt="2024-09-17T14:20:13.262" v="1762" actId="1076"/>
         <pc:sldMkLst>
           <pc:docMk/>
           <pc:sldMk cId="1680260771" sldId="266"/>
@@ -845,6 +901,14 @@
             <pc:docMk/>
             <pc:sldMk cId="1680260771" sldId="266"/>
             <ac:spMk id="3" creationId="{5B501677-012C-4314-0190-18FBEFF194FA}"/>
+          </ac:spMkLst>
+        </pc:spChg>
+        <pc:spChg chg="add mod">
+          <ac:chgData name="Philippe Baucour" userId="5102170ae7533958" providerId="LiveId" clId="{E03E74EA-EF3B-43B4-9B17-52CA29A38D90}" dt="2024-09-17T14:20:13.262" v="1762" actId="1076"/>
+          <ac:spMkLst>
+            <pc:docMk/>
+            <pc:sldMk cId="1680260771" sldId="266"/>
+            <ac:spMk id="3" creationId="{943E50F9-03DA-E900-7D96-8EA970ADED93}"/>
           </ac:spMkLst>
         </pc:spChg>
         <pc:picChg chg="add mod">
@@ -1028,8 +1092,8 @@
           </ac:spMkLst>
         </pc:spChg>
       </pc:sldChg>
-      <pc:sldChg chg="addSp modSp new mod">
-        <pc:chgData name="Philippe Baucour" userId="5102170ae7533958" providerId="LiveId" clId="{E03E74EA-EF3B-43B4-9B17-52CA29A38D90}" dt="2024-08-21T15:35:58.569" v="1354" actId="1076"/>
+      <pc:sldChg chg="addSp modSp new mod modNotesTx">
+        <pc:chgData name="Philippe Baucour" userId="5102170ae7533958" providerId="LiveId" clId="{E03E74EA-EF3B-43B4-9B17-52CA29A38D90}" dt="2024-09-17T14:53:30.962" v="2265"/>
         <pc:sldMkLst>
           <pc:docMk/>
           <pc:sldMk cId="4254941433" sldId="270"/>
@@ -3176,88 +3240,331 @@
           <a:bodyPr/>
           <a:lstStyle/>
           <a:p>
-            <a:r>
-              <a:rPr lang="fr-FR" dirty="0"/>
-              <a:t>Use </a:t>
-            </a:r>
-            <a:r>
-              <a:rPr lang="fr-FR" dirty="0" err="1"/>
-              <a:t>GridSearchCV</a:t>
-            </a:r>
-            <a:r>
-              <a:rPr lang="fr-FR" dirty="0"/>
-              <a:t> to </a:t>
-            </a:r>
-            <a:r>
-              <a:rPr lang="fr-FR" dirty="0" err="1"/>
-              <a:t>find</a:t>
-            </a:r>
-            <a:r>
-              <a:rPr lang="fr-FR" dirty="0"/>
-              <a:t> the best values for :</a:t>
-            </a:r>
-          </a:p>
-          <a:p>
-            <a:pPr marL="171450" indent="-171450">
-              <a:buFont typeface="Arial" panose="020B0604020202020204" pitchFamily="34" charset="0"/>
-              <a:buChar char="•"/>
+            <a:pPr marL="0" marR="0">
+              <a:spcBef>
+                <a:spcPts val="0"/>
+              </a:spcBef>
+              <a:spcAft>
+                <a:spcPts val="0"/>
+              </a:spcAft>
             </a:pPr>
             <a:r>
-              <a:rPr lang="en-US" b="0" i="0" dirty="0" err="1">
-                <a:solidFill>
-                  <a:srgbClr val="CCCCCC"/>
-                </a:solidFill>
+              <a:rPr lang="fr-FR" sz="1800" dirty="0">
                 <a:effectLst/>
-                <a:latin typeface="JetBrains Mono" panose="02000009000000000000" pitchFamily="49" charset="0"/>
+                <a:latin typeface="Courier New" panose="02070309020205020404" pitchFamily="49" charset="0"/>
               </a:rPr>
-              <a:t>ridge__alpha</a:t>
-            </a:r>
-            <a:r>
-              <a:rPr lang="en-US" b="0" i="0" dirty="0">
-                <a:solidFill>
-                  <a:srgbClr val="CCCCCC"/>
-                </a:solidFill>
+              <a:t>RMSE généralement préférée dans les pb de régression</a:t>
+            </a:r>
+          </a:p>
+          <a:p>
+            <a:pPr marL="0" marR="0">
+              <a:spcBef>
+                <a:spcPts val="0"/>
+              </a:spcBef>
+              <a:spcAft>
+                <a:spcPts val="0"/>
+              </a:spcAft>
+            </a:pPr>
+            <a:r>
+              <a:rPr lang="fr-FR" sz="1800" dirty="0">
                 <a:effectLst/>
-                <a:latin typeface="JetBrains Mono" panose="02000009000000000000" pitchFamily="49" charset="0"/>
+                <a:latin typeface="Courier New" panose="02070309020205020404" pitchFamily="49" charset="0"/>
               </a:rPr>
-              <a:t> + </a:t>
-            </a:r>
-            <a:r>
-              <a:rPr lang="en-US" b="0" i="0" dirty="0" err="1">
-                <a:solidFill>
-                  <a:srgbClr val="CCCCCC"/>
-                </a:solidFill>
+              <a:t>Si outliers, faut peut-être prendre en compte la MAE</a:t>
+            </a:r>
+          </a:p>
+          <a:p>
+            <a:pPr marL="0" marR="0">
+              <a:spcBef>
+                <a:spcPts val="0"/>
+              </a:spcBef>
+              <a:spcAft>
+                <a:spcPts val="0"/>
+              </a:spcAft>
+            </a:pPr>
+            <a:r>
+              <a:rPr lang="fr-FR" sz="1800" dirty="0">
                 <a:effectLst/>
-                <a:latin typeface="JetBrains Mono" panose="02000009000000000000" pitchFamily="49" charset="0"/>
+                <a:latin typeface="Courier New" panose="02070309020205020404" pitchFamily="49" charset="0"/>
               </a:rPr>
-              <a:t>ridge__solver</a:t>
-            </a:r>
-            <a:endParaRPr lang="en-US" b="0" i="0" dirty="0">
-              <a:solidFill>
-                <a:srgbClr val="CCCCCC"/>
-              </a:solidFill>
-              <a:effectLst/>
-              <a:latin typeface="JetBrains Mono" panose="02000009000000000000" pitchFamily="49" charset="0"/>
-            </a:endParaRPr>
-          </a:p>
-          <a:p>
-            <a:pPr marL="171450" indent="-171450">
-              <a:buFont typeface="Arial" panose="020B0604020202020204" pitchFamily="34" charset="0"/>
-              <a:buChar char="•"/>
+              <a:t>RMSE (L2 </a:t>
+            </a:r>
+            <a:r>
+              <a:rPr lang="fr-FR" sz="1800" dirty="0" err="1">
+                <a:effectLst/>
+                <a:latin typeface="Courier New" panose="02070309020205020404" pitchFamily="49" charset="0"/>
+              </a:rPr>
+              <a:t>based</a:t>
+            </a:r>
+            <a:r>
+              <a:rPr lang="fr-FR" sz="1800" dirty="0">
+                <a:effectLst/>
+                <a:latin typeface="Courier New" panose="02070309020205020404" pitchFamily="49" charset="0"/>
+              </a:rPr>
+              <a:t>) est plus sensible aux outliers que MAE (L1 </a:t>
+            </a:r>
+            <a:r>
+              <a:rPr lang="fr-FR" sz="1800" dirty="0" err="1">
+                <a:effectLst/>
+                <a:latin typeface="Courier New" panose="02070309020205020404" pitchFamily="49" charset="0"/>
+              </a:rPr>
+              <a:t>based</a:t>
+            </a:r>
+            <a:r>
+              <a:rPr lang="fr-FR" sz="1800" dirty="0">
+                <a:effectLst/>
+                <a:latin typeface="Courier New" panose="02070309020205020404" pitchFamily="49" charset="0"/>
+              </a:rPr>
+              <a:t>)</a:t>
+            </a:r>
+          </a:p>
+          <a:p>
+            <a:pPr marL="0" marR="0">
+              <a:spcBef>
+                <a:spcPts val="0"/>
+              </a:spcBef>
+              <a:spcAft>
+                <a:spcPts val="0"/>
+              </a:spcAft>
             </a:pPr>
             <a:r>
-              <a:rPr lang="fr-FR" b="0" i="0" dirty="0" err="1">
-                <a:solidFill>
-                  <a:srgbClr val="CCCCCC"/>
-                </a:solidFill>
+              <a:rPr lang="fr-FR" sz="1800" dirty="0">
                 <a:effectLst/>
-                <a:latin typeface="JetBrains Mono" panose="02000009000000000000" pitchFamily="49" charset="0"/>
+                <a:latin typeface="Courier New" panose="02070309020205020404" pitchFamily="49" charset="0"/>
               </a:rPr>
-              <a:t>lasso__alpha</a:t>
-            </a:r>
-            <a:r>
-              <a:rPr lang="fr-FR" dirty="0"/>
+              <a:t>MAE et RMSE sont 2 mesures de distance entre vecteurs (prédictions et target)</a:t>
+            </a:r>
+          </a:p>
+          <a:p>
+            <a:pPr marL="0" marR="0">
+              <a:spcBef>
+                <a:spcPts val="0"/>
+              </a:spcBef>
+              <a:spcAft>
+                <a:spcPts val="0"/>
+              </a:spcAft>
+            </a:pPr>
+            <a:r>
+              <a:rPr lang="fr-FR" sz="1800" dirty="0">
+                <a:effectLst/>
+                <a:latin typeface="Courier New" panose="02070309020205020404" pitchFamily="49" charset="0"/>
+              </a:rPr>
+              <a:t>Différentes mesures de distances sont possibles:</a:t>
+            </a:r>
+          </a:p>
+          <a:p>
+            <a:pPr marL="0" marR="0">
+              <a:spcBef>
+                <a:spcPts val="0"/>
+              </a:spcBef>
+              <a:spcAft>
+                <a:spcPts val="0"/>
+              </a:spcAft>
+            </a:pPr>
+            <a:r>
+              <a:rPr lang="fr-FR" sz="1800" dirty="0">
+                <a:effectLst/>
+                <a:latin typeface="Courier New" panose="02070309020205020404" pitchFamily="49" charset="0"/>
+              </a:rPr>
+              <a:t>RMSE : norme euclidienne, L2</a:t>
+            </a:r>
+          </a:p>
+          <a:p>
+            <a:pPr marL="0" marR="0">
+              <a:spcBef>
+                <a:spcPts val="0"/>
+              </a:spcBef>
+              <a:spcAft>
+                <a:spcPts val="0"/>
+              </a:spcAft>
+            </a:pPr>
+            <a:r>
+              <a:rPr lang="fr-FR" sz="1800" dirty="0">
+                <a:effectLst/>
+                <a:latin typeface="Courier New" panose="02070309020205020404" pitchFamily="49" charset="0"/>
+              </a:rPr>
+              <a:t>MAE : norme de Manhattan, L1</a:t>
+            </a:r>
+          </a:p>
+          <a:p>
+            <a:pPr marL="0" marR="0">
+              <a:spcBef>
+                <a:spcPts val="0"/>
+              </a:spcBef>
+              <a:spcAft>
+                <a:spcPts val="0"/>
+              </a:spcAft>
+            </a:pPr>
+            <a:r>
+              <a:rPr lang="fr-FR" sz="1800" dirty="0">
+                <a:effectLst/>
+                <a:latin typeface="Courier New" panose="02070309020205020404" pitchFamily="49" charset="0"/>
+              </a:rPr>
+              <a:t>Plus le n de Ln augmente et plus la norme focalise sur les grandes valeurs en négligeant les petites</a:t>
+            </a:r>
+          </a:p>
+          <a:p>
+            <a:pPr marL="0" marR="0">
+              <a:spcBef>
+                <a:spcPts val="0"/>
+              </a:spcBef>
+              <a:spcAft>
+                <a:spcPts val="0"/>
+              </a:spcAft>
+            </a:pPr>
+            <a:r>
+              <a:rPr lang="fr-FR" sz="1800" dirty="0">
+                <a:effectLst/>
+                <a:latin typeface="Courier New" panose="02070309020205020404" pitchFamily="49" charset="0"/>
+              </a:rPr>
+              <a:t>Quand les outliers sont exponentiellement rares (</a:t>
+            </a:r>
+            <a:r>
+              <a:rPr lang="fr-FR" sz="1800" dirty="0" err="1">
+                <a:effectLst/>
+                <a:latin typeface="Courier New" panose="02070309020205020404" pitchFamily="49" charset="0"/>
+              </a:rPr>
+              <a:t>bell</a:t>
+            </a:r>
+            <a:r>
+              <a:rPr lang="fr-FR" sz="1800" dirty="0">
+                <a:effectLst/>
+                <a:latin typeface="Courier New" panose="02070309020205020404" pitchFamily="49" charset="0"/>
+              </a:rPr>
               <a:t> </a:t>
+            </a:r>
+            <a:r>
+              <a:rPr lang="fr-FR" sz="1800" dirty="0" err="1">
+                <a:effectLst/>
+                <a:latin typeface="Courier New" panose="02070309020205020404" pitchFamily="49" charset="0"/>
+              </a:rPr>
+              <a:t>curve</a:t>
+            </a:r>
+            <a:r>
+              <a:rPr lang="fr-FR" sz="1800" dirty="0">
+                <a:effectLst/>
+                <a:latin typeface="Courier New" panose="02070309020205020404" pitchFamily="49" charset="0"/>
+              </a:rPr>
+              <a:t>) RMSE est plus efficace</a:t>
+            </a:r>
+          </a:p>
+          <a:p>
+            <a:pPr marL="0" marR="0">
+              <a:spcBef>
+                <a:spcPts val="0"/>
+              </a:spcBef>
+              <a:spcAft>
+                <a:spcPts val="0"/>
+              </a:spcAft>
+            </a:pPr>
+            <a:r>
+              <a:rPr lang="fr-FR" sz="1800" dirty="0">
+                <a:effectLst/>
+                <a:latin typeface="Courier New" panose="02070309020205020404" pitchFamily="49" charset="0"/>
+              </a:rPr>
+              <a:t> </a:t>
+            </a:r>
+          </a:p>
+          <a:p>
+            <a:pPr marL="0" marR="0">
+              <a:spcBef>
+                <a:spcPts val="0"/>
+              </a:spcBef>
+              <a:spcAft>
+                <a:spcPts val="0"/>
+              </a:spcAft>
+            </a:pPr>
+            <a:r>
+              <a:rPr lang="fr-FR" sz="1800" dirty="0">
+                <a:effectLst/>
+                <a:latin typeface="Courier New" panose="02070309020205020404" pitchFamily="49" charset="0"/>
+              </a:rPr>
+              <a:t>MAPE : </a:t>
+            </a:r>
+          </a:p>
+          <a:p>
+            <a:pPr marL="0" marR="0">
+              <a:spcBef>
+                <a:spcPts val="0"/>
+              </a:spcBef>
+              <a:spcAft>
+                <a:spcPts val="0"/>
+              </a:spcAft>
+            </a:pPr>
+            <a:r>
+              <a:rPr lang="fr-FR" sz="1800" dirty="0">
+                <a:effectLst/>
+                <a:latin typeface="Courier New" panose="02070309020205020404" pitchFamily="49" charset="0"/>
+              </a:rPr>
+              <a:t>Erreur Absolue Moyenne en % de la vraie valeur</a:t>
+            </a:r>
+          </a:p>
+          <a:p>
+            <a:pPr marL="0" marR="0">
+              <a:spcBef>
+                <a:spcPts val="0"/>
+              </a:spcBef>
+              <a:spcAft>
+                <a:spcPts val="0"/>
+              </a:spcAft>
+            </a:pPr>
+            <a:r>
+              <a:rPr lang="fr-FR" sz="1800" dirty="0">
+                <a:effectLst/>
+                <a:latin typeface="Courier New" panose="02070309020205020404" pitchFamily="49" charset="0"/>
+              </a:rPr>
+              <a:t>Exprimée en %, c'est une mesure simple et intuitive de l'accuracy d'un modèle</a:t>
+            </a:r>
+          </a:p>
+          <a:p>
+            <a:pPr marL="0" marR="0">
+              <a:spcBef>
+                <a:spcPts val="0"/>
+              </a:spcBef>
+              <a:spcAft>
+                <a:spcPts val="0"/>
+              </a:spcAft>
+            </a:pPr>
+            <a:r>
+              <a:rPr lang="fr-FR" sz="1800" dirty="0">
+                <a:effectLst/>
+                <a:latin typeface="Courier New" panose="02070309020205020404" pitchFamily="49" charset="0"/>
+              </a:rPr>
+              <a:t>Important de l'utiliser avec prudence quand les valeurs vraies sont proches de zéro.</a:t>
+            </a:r>
+          </a:p>
+          <a:p>
+            <a:pPr marL="0" marR="0">
+              <a:spcBef>
+                <a:spcPts val="0"/>
+              </a:spcBef>
+              <a:spcAft>
+                <a:spcPts val="0"/>
+              </a:spcAft>
+            </a:pPr>
+            <a:r>
+              <a:rPr lang="fr-FR" sz="1800" dirty="0">
+                <a:effectLst/>
+                <a:latin typeface="Courier New" panose="02070309020205020404" pitchFamily="49" charset="0"/>
+              </a:rPr>
+              <a:t>MAPE=0% : modèle parfait. </a:t>
+            </a:r>
+          </a:p>
+          <a:p>
+            <a:pPr marL="0" marR="0">
+              <a:spcBef>
+                <a:spcPts val="0"/>
+              </a:spcBef>
+              <a:spcAft>
+                <a:spcPts val="0"/>
+              </a:spcAft>
+            </a:pPr>
+            <a:r>
+              <a:rPr lang="fr-FR" sz="1800">
+                <a:effectLst/>
+                <a:latin typeface="Courier New" panose="02070309020205020404" pitchFamily="49" charset="0"/>
+              </a:rPr>
+              <a:t>MAPE élevé : erreurs importantes dans les prédictions</a:t>
             </a:r>
           </a:p>
         </p:txBody>
@@ -3279,7 +3586,7 @@
           <a:p>
             <a:fld id="{341AEC00-4977-4C47-A11B-52155DC12F54}" type="slidenum">
               <a:rPr lang="fr-FR" smtClean="0"/>
-              <a:t>8</a:t>
+              <a:t>7</a:t>
             </a:fld>
             <a:endParaRPr lang="fr-FR"/>
           </a:p>
@@ -3288,7 +3595,7 @@
     </p:spTree>
     <p:extLst>
       <p:ext uri="{BB962C8B-B14F-4D97-AF65-F5344CB8AC3E}">
-        <p14:creationId xmlns:p14="http://schemas.microsoft.com/office/powerpoint/2010/main" val="378655043"/>
+        <p14:creationId xmlns:p14="http://schemas.microsoft.com/office/powerpoint/2010/main" val="3513493551"/>
       </p:ext>
     </p:extLst>
   </p:cSld>
@@ -3342,6 +3649,172 @@
           <a:bodyPr/>
           <a:lstStyle/>
           <a:p>
+            <a:r>
+              <a:rPr lang="fr-FR" dirty="0"/>
+              <a:t>Use </a:t>
+            </a:r>
+            <a:r>
+              <a:rPr lang="fr-FR" dirty="0" err="1"/>
+              <a:t>GridSearchCV</a:t>
+            </a:r>
+            <a:r>
+              <a:rPr lang="fr-FR" dirty="0"/>
+              <a:t> to </a:t>
+            </a:r>
+            <a:r>
+              <a:rPr lang="fr-FR" dirty="0" err="1"/>
+              <a:t>find</a:t>
+            </a:r>
+            <a:r>
+              <a:rPr lang="fr-FR" dirty="0"/>
+              <a:t> the best values for :</a:t>
+            </a:r>
+          </a:p>
+          <a:p>
+            <a:pPr marL="171450" indent="-171450">
+              <a:buFont typeface="Arial" panose="020B0604020202020204" pitchFamily="34" charset="0"/>
+              <a:buChar char="•"/>
+            </a:pPr>
+            <a:r>
+              <a:rPr lang="en-US" b="0" i="0" dirty="0" err="1">
+                <a:solidFill>
+                  <a:srgbClr val="CCCCCC"/>
+                </a:solidFill>
+                <a:effectLst/>
+                <a:latin typeface="JetBrains Mono" panose="02000009000000000000" pitchFamily="49" charset="0"/>
+              </a:rPr>
+              <a:t>ridge__alpha</a:t>
+            </a:r>
+            <a:r>
+              <a:rPr lang="en-US" b="0" i="0" dirty="0">
+                <a:solidFill>
+                  <a:srgbClr val="CCCCCC"/>
+                </a:solidFill>
+                <a:effectLst/>
+                <a:latin typeface="JetBrains Mono" panose="02000009000000000000" pitchFamily="49" charset="0"/>
+              </a:rPr>
+              <a:t> + </a:t>
+            </a:r>
+            <a:r>
+              <a:rPr lang="en-US" b="0" i="0" dirty="0" err="1">
+                <a:solidFill>
+                  <a:srgbClr val="CCCCCC"/>
+                </a:solidFill>
+                <a:effectLst/>
+                <a:latin typeface="JetBrains Mono" panose="02000009000000000000" pitchFamily="49" charset="0"/>
+              </a:rPr>
+              <a:t>ridge__solver</a:t>
+            </a:r>
+            <a:endParaRPr lang="en-US" b="0" i="0" dirty="0">
+              <a:solidFill>
+                <a:srgbClr val="CCCCCC"/>
+              </a:solidFill>
+              <a:effectLst/>
+              <a:latin typeface="JetBrains Mono" panose="02000009000000000000" pitchFamily="49" charset="0"/>
+            </a:endParaRPr>
+          </a:p>
+          <a:p>
+            <a:pPr marL="171450" indent="-171450">
+              <a:buFont typeface="Arial" panose="020B0604020202020204" pitchFamily="34" charset="0"/>
+              <a:buChar char="•"/>
+            </a:pPr>
+            <a:r>
+              <a:rPr lang="fr-FR" b="0" i="0" dirty="0" err="1">
+                <a:solidFill>
+                  <a:srgbClr val="CCCCCC"/>
+                </a:solidFill>
+                <a:effectLst/>
+                <a:latin typeface="JetBrains Mono" panose="02000009000000000000" pitchFamily="49" charset="0"/>
+              </a:rPr>
+              <a:t>lasso__alpha</a:t>
+            </a:r>
+            <a:r>
+              <a:rPr lang="fr-FR" dirty="0"/>
+              <a:t> </a:t>
+            </a:r>
+          </a:p>
+        </p:txBody>
+      </p:sp>
+      <p:sp>
+        <p:nvSpPr>
+          <p:cNvPr id="4" name="Espace réservé du numéro de diapositive 3"/>
+          <p:cNvSpPr>
+            <a:spLocks noGrp="1"/>
+          </p:cNvSpPr>
+          <p:nvPr>
+            <p:ph type="sldNum" sz="quarter" idx="5"/>
+          </p:nvPr>
+        </p:nvSpPr>
+        <p:spPr/>
+        <p:txBody>
+          <a:bodyPr/>
+          <a:lstStyle/>
+          <a:p>
+            <a:fld id="{341AEC00-4977-4C47-A11B-52155DC12F54}" type="slidenum">
+              <a:rPr lang="fr-FR" smtClean="0"/>
+              <a:t>8</a:t>
+            </a:fld>
+            <a:endParaRPr lang="fr-FR"/>
+          </a:p>
+        </p:txBody>
+      </p:sp>
+    </p:spTree>
+    <p:extLst>
+      <p:ext uri="{BB962C8B-B14F-4D97-AF65-F5344CB8AC3E}">
+        <p14:creationId xmlns:p14="http://schemas.microsoft.com/office/powerpoint/2010/main" val="378655043"/>
+      </p:ext>
+    </p:extLst>
+  </p:cSld>
+  <p:clrMapOvr>
+    <a:masterClrMapping/>
+  </p:clrMapOvr>
+</p:notes>
+</file>
+
+<file path=ppt/notesSlides/notesSlide7.xml><?xml version="1.0" encoding="utf-8"?>
+<p:notes xmlns:a="http://schemas.openxmlformats.org/drawingml/2006/main" xmlns:r="http://schemas.openxmlformats.org/officeDocument/2006/relationships" xmlns:p="http://schemas.openxmlformats.org/presentationml/2006/main">
+  <p:cSld>
+    <p:spTree>
+      <p:nvGrpSpPr>
+        <p:cNvPr id="1" name=""/>
+        <p:cNvGrpSpPr/>
+        <p:nvPr/>
+      </p:nvGrpSpPr>
+      <p:grpSpPr>
+        <a:xfrm>
+          <a:off x="0" y="0"/>
+          <a:ext cx="0" cy="0"/>
+          <a:chOff x="0" y="0"/>
+          <a:chExt cx="0" cy="0"/>
+        </a:xfrm>
+      </p:grpSpPr>
+      <p:sp>
+        <p:nvSpPr>
+          <p:cNvPr id="2" name="Espace réservé de l'image des diapositives 1"/>
+          <p:cNvSpPr>
+            <a:spLocks noGrp="1" noRot="1" noChangeAspect="1"/>
+          </p:cNvSpPr>
+          <p:nvPr>
+            <p:ph type="sldImg"/>
+          </p:nvPr>
+        </p:nvSpPr>
+        <p:spPr/>
+      </p:sp>
+      <p:sp>
+        <p:nvSpPr>
+          <p:cNvPr id="3" name="Espace réservé des notes 2"/>
+          <p:cNvSpPr>
+            <a:spLocks noGrp="1"/>
+          </p:cNvSpPr>
+          <p:nvPr>
+            <p:ph type="body" idx="1"/>
+          </p:nvPr>
+        </p:nvSpPr>
+        <p:spPr/>
+        <p:txBody>
+          <a:bodyPr/>
+          <a:lstStyle/>
+          <a:p>
             <a:pPr marL="0" marR="0" lvl="0" indent="0" algn="l" defTabSz="914400" rtl="0" eaLnBrk="1" fontAlgn="auto" latinLnBrk="0" hangingPunct="1">
               <a:lnSpc>
                 <a:spcPct val="100000"/>
@@ -3446,10 +3919,9 @@
               <a:defRPr/>
             </a:pPr>
             <a:r>
-              <a:rPr lang="en-US"/>
+              <a:rPr lang="en-US" dirty="0"/>
               <a:t>API &amp; App		: </a:t>
             </a:r>
-            <a:endParaRPr lang="en-US" dirty="0"/>
           </a:p>
         </p:txBody>
       </p:sp>
@@ -7094,6 +7566,287 @@
           </a:p>
         </p:txBody>
       </p:sp>
+      <p:grpSp>
+        <p:nvGrpSpPr>
+          <p:cNvPr id="5" name="Groupe 4">
+            <a:extLst>
+              <a:ext uri="{FF2B5EF4-FFF2-40B4-BE49-F238E27FC236}">
+                <a16:creationId xmlns:a16="http://schemas.microsoft.com/office/drawing/2014/main" id="{1F7DA58F-CACE-B4F2-936D-0C00F91DDAD5}"/>
+              </a:ext>
+            </a:extLst>
+          </p:cNvPr>
+          <p:cNvGrpSpPr/>
+          <p:nvPr/>
+        </p:nvGrpSpPr>
+        <p:grpSpPr>
+          <a:xfrm>
+            <a:off x="7462232" y="258948"/>
+            <a:ext cx="180000" cy="1253363"/>
+            <a:chOff x="7486295" y="3676973"/>
+            <a:chExt cx="180000" cy="1253363"/>
+          </a:xfrm>
+        </p:grpSpPr>
+        <p:sp>
+          <p:nvSpPr>
+            <p:cNvPr id="6" name="Ellipse 5">
+              <a:extLst>
+                <a:ext uri="{FF2B5EF4-FFF2-40B4-BE49-F238E27FC236}">
+                  <a16:creationId xmlns:a16="http://schemas.microsoft.com/office/drawing/2014/main" id="{452CC63D-3BBA-3175-4D69-47738F3F29AD}"/>
+                </a:ext>
+              </a:extLst>
+            </p:cNvPr>
+            <p:cNvSpPr/>
+            <p:nvPr/>
+          </p:nvSpPr>
+          <p:spPr>
+            <a:xfrm>
+              <a:off x="7486295" y="3676973"/>
+              <a:ext cx="180000" cy="180000"/>
+            </a:xfrm>
+            <a:prstGeom prst="ellipse">
+              <a:avLst/>
+            </a:prstGeom>
+            <a:solidFill>
+              <a:srgbClr val="92D050"/>
+            </a:solidFill>
+            <a:ln>
+              <a:noFill/>
+            </a:ln>
+          </p:spPr>
+          <p:style>
+            <a:lnRef idx="2">
+              <a:schemeClr val="accent1">
+                <a:shade val="15000"/>
+              </a:schemeClr>
+            </a:lnRef>
+            <a:fillRef idx="1">
+              <a:schemeClr val="accent1"/>
+            </a:fillRef>
+            <a:effectRef idx="0">
+              <a:schemeClr val="accent1"/>
+            </a:effectRef>
+            <a:fontRef idx="minor">
+              <a:schemeClr val="lt1"/>
+            </a:fontRef>
+          </p:style>
+          <p:txBody>
+            <a:bodyPr rtlCol="0" anchor="ctr"/>
+            <a:lstStyle/>
+            <a:p>
+              <a:pPr algn="ctr"/>
+              <a:endParaRPr lang="fr-FR"/>
+            </a:p>
+          </p:txBody>
+        </p:sp>
+        <p:sp>
+          <p:nvSpPr>
+            <p:cNvPr id="7" name="Ellipse 6">
+              <a:extLst>
+                <a:ext uri="{FF2B5EF4-FFF2-40B4-BE49-F238E27FC236}">
+                  <a16:creationId xmlns:a16="http://schemas.microsoft.com/office/drawing/2014/main" id="{CD3A35DC-88D7-A3EF-FBF7-FE5B87B742A8}"/>
+                </a:ext>
+              </a:extLst>
+            </p:cNvPr>
+            <p:cNvSpPr/>
+            <p:nvPr/>
+          </p:nvSpPr>
+          <p:spPr>
+            <a:xfrm>
+              <a:off x="7486295" y="3945314"/>
+              <a:ext cx="180000" cy="180000"/>
+            </a:xfrm>
+            <a:prstGeom prst="ellipse">
+              <a:avLst/>
+            </a:prstGeom>
+            <a:solidFill>
+              <a:srgbClr val="92D050"/>
+            </a:solidFill>
+            <a:ln>
+              <a:noFill/>
+            </a:ln>
+          </p:spPr>
+          <p:style>
+            <a:lnRef idx="2">
+              <a:schemeClr val="accent1">
+                <a:shade val="15000"/>
+              </a:schemeClr>
+            </a:lnRef>
+            <a:fillRef idx="1">
+              <a:schemeClr val="accent1"/>
+            </a:fillRef>
+            <a:effectRef idx="0">
+              <a:schemeClr val="accent1"/>
+            </a:effectRef>
+            <a:fontRef idx="minor">
+              <a:schemeClr val="lt1"/>
+            </a:fontRef>
+          </p:style>
+          <p:txBody>
+            <a:bodyPr rtlCol="0" anchor="ctr"/>
+            <a:lstStyle/>
+            <a:p>
+              <a:pPr algn="ctr"/>
+              <a:endParaRPr lang="fr-FR"/>
+            </a:p>
+          </p:txBody>
+        </p:sp>
+        <p:sp>
+          <p:nvSpPr>
+            <p:cNvPr id="8" name="Ellipse 7">
+              <a:extLst>
+                <a:ext uri="{FF2B5EF4-FFF2-40B4-BE49-F238E27FC236}">
+                  <a16:creationId xmlns:a16="http://schemas.microsoft.com/office/drawing/2014/main" id="{CF0F7D9C-9002-475C-F827-83C1E0CE8EA9}"/>
+                </a:ext>
+              </a:extLst>
+            </p:cNvPr>
+            <p:cNvSpPr/>
+            <p:nvPr/>
+          </p:nvSpPr>
+          <p:spPr>
+            <a:xfrm>
+              <a:off x="7486295" y="4213655"/>
+              <a:ext cx="180000" cy="180000"/>
+            </a:xfrm>
+            <a:prstGeom prst="ellipse">
+              <a:avLst/>
+            </a:prstGeom>
+            <a:solidFill>
+              <a:srgbClr val="92D050"/>
+            </a:solidFill>
+            <a:ln>
+              <a:noFill/>
+            </a:ln>
+          </p:spPr>
+          <p:style>
+            <a:lnRef idx="2">
+              <a:schemeClr val="accent1">
+                <a:shade val="15000"/>
+              </a:schemeClr>
+            </a:lnRef>
+            <a:fillRef idx="1">
+              <a:schemeClr val="accent1"/>
+            </a:fillRef>
+            <a:effectRef idx="0">
+              <a:schemeClr val="accent1"/>
+            </a:effectRef>
+            <a:fontRef idx="minor">
+              <a:schemeClr val="lt1"/>
+            </a:fontRef>
+          </p:style>
+          <p:txBody>
+            <a:bodyPr rtlCol="0" anchor="ctr"/>
+            <a:lstStyle/>
+            <a:p>
+              <a:pPr algn="ctr"/>
+              <a:endParaRPr lang="fr-FR"/>
+            </a:p>
+          </p:txBody>
+        </p:sp>
+        <p:sp>
+          <p:nvSpPr>
+            <p:cNvPr id="9" name="Ellipse 8">
+              <a:extLst>
+                <a:ext uri="{FF2B5EF4-FFF2-40B4-BE49-F238E27FC236}">
+                  <a16:creationId xmlns:a16="http://schemas.microsoft.com/office/drawing/2014/main" id="{01D4FDA3-B3CF-D582-0365-F10997D76625}"/>
+                </a:ext>
+              </a:extLst>
+            </p:cNvPr>
+            <p:cNvSpPr/>
+            <p:nvPr/>
+          </p:nvSpPr>
+          <p:spPr>
+            <a:xfrm>
+              <a:off x="7486295" y="4481996"/>
+              <a:ext cx="180000" cy="180000"/>
+            </a:xfrm>
+            <a:prstGeom prst="ellipse">
+              <a:avLst/>
+            </a:prstGeom>
+            <a:solidFill>
+              <a:srgbClr val="92D050"/>
+            </a:solidFill>
+            <a:ln>
+              <a:noFill/>
+            </a:ln>
+          </p:spPr>
+          <p:style>
+            <a:lnRef idx="2">
+              <a:schemeClr val="accent1">
+                <a:shade val="15000"/>
+              </a:schemeClr>
+            </a:lnRef>
+            <a:fillRef idx="1">
+              <a:schemeClr val="accent1"/>
+            </a:fillRef>
+            <a:effectRef idx="0">
+              <a:schemeClr val="accent1"/>
+            </a:effectRef>
+            <a:fontRef idx="minor">
+              <a:schemeClr val="lt1"/>
+            </a:fontRef>
+          </p:style>
+          <p:txBody>
+            <a:bodyPr rtlCol="0" anchor="ctr"/>
+            <a:lstStyle/>
+            <a:p>
+              <a:pPr algn="ctr"/>
+              <a:endParaRPr lang="fr-FR"/>
+            </a:p>
+          </p:txBody>
+        </p:sp>
+        <p:sp>
+          <p:nvSpPr>
+            <p:cNvPr id="10" name="Ellipse 9">
+              <a:extLst>
+                <a:ext uri="{FF2B5EF4-FFF2-40B4-BE49-F238E27FC236}">
+                  <a16:creationId xmlns:a16="http://schemas.microsoft.com/office/drawing/2014/main" id="{725E149A-555C-6062-2656-24AECCCC0790}"/>
+                </a:ext>
+              </a:extLst>
+            </p:cNvPr>
+            <p:cNvSpPr/>
+            <p:nvPr/>
+          </p:nvSpPr>
+          <p:spPr>
+            <a:xfrm>
+              <a:off x="7486295" y="4750336"/>
+              <a:ext cx="180000" cy="180000"/>
+            </a:xfrm>
+            <a:prstGeom prst="ellipse">
+              <a:avLst/>
+            </a:prstGeom>
+            <a:solidFill>
+              <a:srgbClr val="C00000"/>
+            </a:solidFill>
+            <a:ln>
+              <a:noFill/>
+            </a:ln>
+          </p:spPr>
+          <p:style>
+            <a:lnRef idx="2">
+              <a:schemeClr val="accent1">
+                <a:shade val="15000"/>
+              </a:schemeClr>
+            </a:lnRef>
+            <a:fillRef idx="1">
+              <a:schemeClr val="accent1"/>
+            </a:fillRef>
+            <a:effectRef idx="0">
+              <a:schemeClr val="accent1"/>
+            </a:effectRef>
+            <a:fontRef idx="minor">
+              <a:schemeClr val="lt1"/>
+            </a:fontRef>
+          </p:style>
+          <p:txBody>
+            <a:bodyPr rtlCol="0" anchor="ctr"/>
+            <a:lstStyle/>
+            <a:p>
+              <a:pPr algn="ctr"/>
+              <a:endParaRPr lang="fr-FR"/>
+            </a:p>
+          </p:txBody>
+        </p:sp>
+      </p:grpSp>
     </p:spTree>
     <p:extLst>
       <p:ext uri="{BB962C8B-B14F-4D97-AF65-F5344CB8AC3E}">
@@ -7104,6 +7857,333 @@
   <p:clrMapOvr>
     <a:masterClrMapping/>
   </p:clrMapOvr>
+  <p:timing>
+    <p:tnLst>
+      <p:par>
+        <p:cTn id="1" dur="indefinite" restart="never" nodeType="tmRoot">
+          <p:childTnLst>
+            <p:seq concurrent="1" nextAc="seek">
+              <p:cTn id="2" dur="indefinite" nodeType="mainSeq">
+                <p:childTnLst>
+                  <p:par>
+                    <p:cTn id="3" fill="hold">
+                      <p:stCondLst>
+                        <p:cond delay="indefinite"/>
+                      </p:stCondLst>
+                      <p:childTnLst>
+                        <p:par>
+                          <p:cTn id="4" fill="hold">
+                            <p:stCondLst>
+                              <p:cond delay="0"/>
+                            </p:stCondLst>
+                            <p:childTnLst>
+                              <p:par>
+                                <p:cTn id="5" presetID="1" presetClass="entr" presetSubtype="0" fill="hold" grpId="0" nodeType="clickEffect">
+                                  <p:stCondLst>
+                                    <p:cond delay="0"/>
+                                  </p:stCondLst>
+                                  <p:childTnLst>
+                                    <p:set>
+                                      <p:cBhvr>
+                                        <p:cTn id="6" dur="1" fill="hold">
+                                          <p:stCondLst>
+                                            <p:cond delay="0"/>
+                                          </p:stCondLst>
+                                        </p:cTn>
+                                        <p:tgtEl>
+                                          <p:spTgt spid="3">
+                                            <p:txEl>
+                                              <p:pRg st="2" end="2"/>
+                                            </p:txEl>
+                                          </p:spTgt>
+                                        </p:tgtEl>
+                                        <p:attrNameLst>
+                                          <p:attrName>style.visibility</p:attrName>
+                                        </p:attrNameLst>
+                                      </p:cBhvr>
+                                      <p:to>
+                                        <p:strVal val="visible"/>
+                                      </p:to>
+                                    </p:set>
+                                  </p:childTnLst>
+                                </p:cTn>
+                              </p:par>
+                            </p:childTnLst>
+                          </p:cTn>
+                        </p:par>
+                      </p:childTnLst>
+                    </p:cTn>
+                  </p:par>
+                  <p:par>
+                    <p:cTn id="7" fill="hold">
+                      <p:stCondLst>
+                        <p:cond delay="indefinite"/>
+                      </p:stCondLst>
+                      <p:childTnLst>
+                        <p:par>
+                          <p:cTn id="8" fill="hold">
+                            <p:stCondLst>
+                              <p:cond delay="0"/>
+                            </p:stCondLst>
+                            <p:childTnLst>
+                              <p:par>
+                                <p:cTn id="9" presetID="1" presetClass="entr" presetSubtype="0" fill="hold" grpId="0" nodeType="clickEffect">
+                                  <p:stCondLst>
+                                    <p:cond delay="0"/>
+                                  </p:stCondLst>
+                                  <p:childTnLst>
+                                    <p:set>
+                                      <p:cBhvr>
+                                        <p:cTn id="10" dur="1" fill="hold">
+                                          <p:stCondLst>
+                                            <p:cond delay="0"/>
+                                          </p:stCondLst>
+                                        </p:cTn>
+                                        <p:tgtEl>
+                                          <p:spTgt spid="3">
+                                            <p:txEl>
+                                              <p:pRg st="3" end="3"/>
+                                            </p:txEl>
+                                          </p:spTgt>
+                                        </p:tgtEl>
+                                        <p:attrNameLst>
+                                          <p:attrName>style.visibility</p:attrName>
+                                        </p:attrNameLst>
+                                      </p:cBhvr>
+                                      <p:to>
+                                        <p:strVal val="visible"/>
+                                      </p:to>
+                                    </p:set>
+                                  </p:childTnLst>
+                                </p:cTn>
+                              </p:par>
+                            </p:childTnLst>
+                          </p:cTn>
+                        </p:par>
+                      </p:childTnLst>
+                    </p:cTn>
+                  </p:par>
+                  <p:par>
+                    <p:cTn id="11" fill="hold">
+                      <p:stCondLst>
+                        <p:cond delay="indefinite"/>
+                      </p:stCondLst>
+                      <p:childTnLst>
+                        <p:par>
+                          <p:cTn id="12" fill="hold">
+                            <p:stCondLst>
+                              <p:cond delay="0"/>
+                            </p:stCondLst>
+                            <p:childTnLst>
+                              <p:par>
+                                <p:cTn id="13" presetID="1" presetClass="entr" presetSubtype="0" fill="hold" grpId="0" nodeType="clickEffect">
+                                  <p:stCondLst>
+                                    <p:cond delay="0"/>
+                                  </p:stCondLst>
+                                  <p:childTnLst>
+                                    <p:set>
+                                      <p:cBhvr>
+                                        <p:cTn id="14" dur="1" fill="hold">
+                                          <p:stCondLst>
+                                            <p:cond delay="0"/>
+                                          </p:stCondLst>
+                                        </p:cTn>
+                                        <p:tgtEl>
+                                          <p:spTgt spid="3">
+                                            <p:txEl>
+                                              <p:pRg st="4" end="4"/>
+                                            </p:txEl>
+                                          </p:spTgt>
+                                        </p:tgtEl>
+                                        <p:attrNameLst>
+                                          <p:attrName>style.visibility</p:attrName>
+                                        </p:attrNameLst>
+                                      </p:cBhvr>
+                                      <p:to>
+                                        <p:strVal val="visible"/>
+                                      </p:to>
+                                    </p:set>
+                                  </p:childTnLst>
+                                </p:cTn>
+                              </p:par>
+                            </p:childTnLst>
+                          </p:cTn>
+                        </p:par>
+                      </p:childTnLst>
+                    </p:cTn>
+                  </p:par>
+                  <p:par>
+                    <p:cTn id="15" fill="hold">
+                      <p:stCondLst>
+                        <p:cond delay="indefinite"/>
+                      </p:stCondLst>
+                      <p:childTnLst>
+                        <p:par>
+                          <p:cTn id="16" fill="hold">
+                            <p:stCondLst>
+                              <p:cond delay="0"/>
+                            </p:stCondLst>
+                            <p:childTnLst>
+                              <p:par>
+                                <p:cTn id="17" presetID="1" presetClass="entr" presetSubtype="0" fill="hold" grpId="0" nodeType="clickEffect">
+                                  <p:stCondLst>
+                                    <p:cond delay="0"/>
+                                  </p:stCondLst>
+                                  <p:childTnLst>
+                                    <p:set>
+                                      <p:cBhvr>
+                                        <p:cTn id="18" dur="1" fill="hold">
+                                          <p:stCondLst>
+                                            <p:cond delay="0"/>
+                                          </p:stCondLst>
+                                        </p:cTn>
+                                        <p:tgtEl>
+                                          <p:spTgt spid="3">
+                                            <p:txEl>
+                                              <p:pRg st="5" end="5"/>
+                                            </p:txEl>
+                                          </p:spTgt>
+                                        </p:tgtEl>
+                                        <p:attrNameLst>
+                                          <p:attrName>style.visibility</p:attrName>
+                                        </p:attrNameLst>
+                                      </p:cBhvr>
+                                      <p:to>
+                                        <p:strVal val="visible"/>
+                                      </p:to>
+                                    </p:set>
+                                  </p:childTnLst>
+                                </p:cTn>
+                              </p:par>
+                            </p:childTnLst>
+                          </p:cTn>
+                        </p:par>
+                      </p:childTnLst>
+                    </p:cTn>
+                  </p:par>
+                  <p:par>
+                    <p:cTn id="19" fill="hold">
+                      <p:stCondLst>
+                        <p:cond delay="indefinite"/>
+                      </p:stCondLst>
+                      <p:childTnLst>
+                        <p:par>
+                          <p:cTn id="20" fill="hold">
+                            <p:stCondLst>
+                              <p:cond delay="0"/>
+                            </p:stCondLst>
+                            <p:childTnLst>
+                              <p:par>
+                                <p:cTn id="21" presetID="1" presetClass="entr" presetSubtype="0" fill="hold" grpId="0" nodeType="clickEffect">
+                                  <p:stCondLst>
+                                    <p:cond delay="0"/>
+                                  </p:stCondLst>
+                                  <p:childTnLst>
+                                    <p:set>
+                                      <p:cBhvr>
+                                        <p:cTn id="22" dur="1" fill="hold">
+                                          <p:stCondLst>
+                                            <p:cond delay="0"/>
+                                          </p:stCondLst>
+                                        </p:cTn>
+                                        <p:tgtEl>
+                                          <p:spTgt spid="3">
+                                            <p:txEl>
+                                              <p:pRg st="6" end="6"/>
+                                            </p:txEl>
+                                          </p:spTgt>
+                                        </p:tgtEl>
+                                        <p:attrNameLst>
+                                          <p:attrName>style.visibility</p:attrName>
+                                        </p:attrNameLst>
+                                      </p:cBhvr>
+                                      <p:to>
+                                        <p:strVal val="visible"/>
+                                      </p:to>
+                                    </p:set>
+                                  </p:childTnLst>
+                                </p:cTn>
+                              </p:par>
+                            </p:childTnLst>
+                          </p:cTn>
+                        </p:par>
+                      </p:childTnLst>
+                    </p:cTn>
+                  </p:par>
+                  <p:par>
+                    <p:cTn id="23" fill="hold">
+                      <p:stCondLst>
+                        <p:cond delay="indefinite"/>
+                      </p:stCondLst>
+                      <p:childTnLst>
+                        <p:par>
+                          <p:cTn id="24" fill="hold">
+                            <p:stCondLst>
+                              <p:cond delay="0"/>
+                            </p:stCondLst>
+                            <p:childTnLst>
+                              <p:par>
+                                <p:cTn id="25" presetID="1" presetClass="entr" presetSubtype="0" fill="hold" grpId="0" nodeType="clickEffect">
+                                  <p:stCondLst>
+                                    <p:cond delay="0"/>
+                                  </p:stCondLst>
+                                  <p:childTnLst>
+                                    <p:set>
+                                      <p:cBhvr>
+                                        <p:cTn id="26" dur="1" fill="hold">
+                                          <p:stCondLst>
+                                            <p:cond delay="0"/>
+                                          </p:stCondLst>
+                                        </p:cTn>
+                                        <p:tgtEl>
+                                          <p:spTgt spid="3">
+                                            <p:txEl>
+                                              <p:pRg st="7" end="7"/>
+                                            </p:txEl>
+                                          </p:spTgt>
+                                        </p:tgtEl>
+                                        <p:attrNameLst>
+                                          <p:attrName>style.visibility</p:attrName>
+                                        </p:attrNameLst>
+                                      </p:cBhvr>
+                                      <p:to>
+                                        <p:strVal val="visible"/>
+                                      </p:to>
+                                    </p:set>
+                                  </p:childTnLst>
+                                </p:cTn>
+                              </p:par>
+                            </p:childTnLst>
+                          </p:cTn>
+                        </p:par>
+                      </p:childTnLst>
+                    </p:cTn>
+                  </p:par>
+                </p:childTnLst>
+              </p:cTn>
+              <p:prevCondLst>
+                <p:cond evt="onPrev" delay="0">
+                  <p:tgtEl>
+                    <p:sldTgt/>
+                  </p:tgtEl>
+                </p:cond>
+              </p:prevCondLst>
+              <p:nextCondLst>
+                <p:cond evt="onNext" delay="0">
+                  <p:tgtEl>
+                    <p:sldTgt/>
+                  </p:tgtEl>
+                </p:cond>
+              </p:nextCondLst>
+            </p:seq>
+          </p:childTnLst>
+        </p:cTn>
+      </p:par>
+    </p:tnLst>
+    <p:bldLst>
+      <p:bldP spid="3" grpId="0" build="p"/>
+    </p:bldLst>
+  </p:timing>
 </p:sld>
 </file>
 
@@ -7390,8 +8470,8 @@
           <p:nvPr/>
         </p:nvSpPr>
         <p:spPr>
-          <a:xfrm>
-            <a:off x="1458259" y="5553508"/>
+          <a:xfrm rot="16200000">
+            <a:off x="5147945" y="5008077"/>
             <a:ext cx="464127" cy="644236"/>
           </a:xfrm>
           <a:prstGeom prst="upArrow">
@@ -7400,6 +8480,16 @@
           <a:solidFill>
             <a:srgbClr val="FF0000"/>
           </a:solidFill>
+          <a:ln>
+            <a:noFill/>
+          </a:ln>
+          <a:effectLst>
+            <a:outerShdw blurRad="50800" dist="38100" dir="2700000" algn="tl" rotWithShape="0">
+              <a:prstClr val="black">
+                <a:alpha val="40000"/>
+              </a:prstClr>
+            </a:outerShdw>
+          </a:effectLst>
         </p:spPr>
         <p:style>
           <a:lnRef idx="2">
@@ -7574,6 +8664,65 @@
           </a:fillRef>
           <a:effectRef idx="0">
             <a:schemeClr val="accent4"/>
+          </a:effectRef>
+          <a:fontRef idx="minor">
+            <a:schemeClr val="lt1"/>
+          </a:fontRef>
+        </p:style>
+        <p:txBody>
+          <a:bodyPr rtlCol="0" anchor="ctr"/>
+          <a:lstStyle/>
+          <a:p>
+            <a:pPr algn="ctr"/>
+            <a:endParaRPr lang="fr-FR"/>
+          </a:p>
+        </p:txBody>
+      </p:sp>
+      <p:sp>
+        <p:nvSpPr>
+          <p:cNvPr id="3" name="Flèche : haut 2">
+            <a:extLst>
+              <a:ext uri="{FF2B5EF4-FFF2-40B4-BE49-F238E27FC236}">
+                <a16:creationId xmlns:a16="http://schemas.microsoft.com/office/drawing/2014/main" id="{68AC9EB8-470B-F4C1-C0DE-08DE401A91F7}"/>
+              </a:ext>
+            </a:extLst>
+          </p:cNvPr>
+          <p:cNvSpPr/>
+          <p:nvPr/>
+        </p:nvSpPr>
+        <p:spPr>
+          <a:xfrm rot="16200000">
+            <a:off x="6186055" y="4197951"/>
+            <a:ext cx="464127" cy="644236"/>
+          </a:xfrm>
+          <a:prstGeom prst="upArrow">
+            <a:avLst/>
+          </a:prstGeom>
+          <a:solidFill>
+            <a:srgbClr val="FFA700"/>
+          </a:solidFill>
+          <a:ln>
+            <a:noFill/>
+          </a:ln>
+          <a:effectLst>
+            <a:outerShdw blurRad="50800" dist="38100" dir="2700000" algn="tl" rotWithShape="0">
+              <a:prstClr val="black">
+                <a:alpha val="40000"/>
+              </a:prstClr>
+            </a:outerShdw>
+          </a:effectLst>
+        </p:spPr>
+        <p:style>
+          <a:lnRef idx="2">
+            <a:schemeClr val="accent1">
+              <a:shade val="15000"/>
+            </a:schemeClr>
+          </a:lnRef>
+          <a:fillRef idx="1">
+            <a:schemeClr val="accent1"/>
+          </a:fillRef>
+          <a:effectRef idx="0">
+            <a:schemeClr val="accent1"/>
           </a:effectRef>
           <a:fontRef idx="minor">
             <a:schemeClr val="lt1"/>
@@ -8218,6 +9367,55 @@
           </a:effectLst>
         </p:spPr>
       </p:pic>
+      <p:sp>
+        <p:nvSpPr>
+          <p:cNvPr id="3" name="Flèche : haut 2">
+            <a:extLst>
+              <a:ext uri="{FF2B5EF4-FFF2-40B4-BE49-F238E27FC236}">
+                <a16:creationId xmlns:a16="http://schemas.microsoft.com/office/drawing/2014/main" id="{943E50F9-03DA-E900-7D96-8EA970ADED93}"/>
+              </a:ext>
+            </a:extLst>
+          </p:cNvPr>
+          <p:cNvSpPr/>
+          <p:nvPr/>
+        </p:nvSpPr>
+        <p:spPr>
+          <a:xfrm rot="13790465">
+            <a:off x="2750166" y="3986549"/>
+            <a:ext cx="464127" cy="644236"/>
+          </a:xfrm>
+          <a:prstGeom prst="upArrow">
+            <a:avLst/>
+          </a:prstGeom>
+          <a:solidFill>
+            <a:srgbClr val="FF0000"/>
+          </a:solidFill>
+        </p:spPr>
+        <p:style>
+          <a:lnRef idx="2">
+            <a:schemeClr val="accent1">
+              <a:shade val="15000"/>
+            </a:schemeClr>
+          </a:lnRef>
+          <a:fillRef idx="1">
+            <a:schemeClr val="accent1"/>
+          </a:fillRef>
+          <a:effectRef idx="0">
+            <a:schemeClr val="accent1"/>
+          </a:effectRef>
+          <a:fontRef idx="minor">
+            <a:schemeClr val="lt1"/>
+          </a:fontRef>
+        </p:style>
+        <p:txBody>
+          <a:bodyPr rtlCol="0" anchor="ctr"/>
+          <a:lstStyle/>
+          <a:p>
+            <a:pPr algn="ctr"/>
+            <a:endParaRPr lang="fr-FR"/>
+          </a:p>
+        </p:txBody>
+      </p:sp>
     </p:spTree>
     <p:extLst>
       <p:ext uri="{BB962C8B-B14F-4D97-AF65-F5344CB8AC3E}">
@@ -8316,7 +9514,7 @@
           <p:nvPr/>
         </p:nvPicPr>
         <p:blipFill>
-          <a:blip r:embed="rId2"/>
+          <a:blip r:embed="rId3"/>
           <a:stretch>
             <a:fillRect/>
           </a:stretch>
@@ -8402,7 +9600,7 @@
           <p:nvPr/>
         </p:nvPicPr>
         <p:blipFill>
-          <a:blip r:embed="rId3"/>
+          <a:blip r:embed="rId4"/>
           <a:stretch>
             <a:fillRect/>
           </a:stretch>
@@ -8439,7 +9637,7 @@
           <p:nvPr/>
         </p:nvPicPr>
         <p:blipFill>
-          <a:blip r:embed="rId4"/>
+          <a:blip r:embed="rId5"/>
           <a:stretch>
             <a:fillRect/>
           </a:stretch>

</xml_diff>

<commit_message>
Slide review. Again, yes I know...
</commit_message>
<xml_diff>
--- a/05_supervised_ML/98_Project_Walmart/01_walmart_project.pptx
+++ b/05_supervised_ML/98_Project_Walmart/01_walmart_project.pptx
@@ -128,7 +128,7 @@
 <file path=ppt/revisionInfo.xml><?xml version="1.0" encoding="utf-8"?>
 <p1510:revInfo xmlns:a="http://schemas.openxmlformats.org/drawingml/2006/main" xmlns:r="http://schemas.openxmlformats.org/officeDocument/2006/relationships" xmlns:p1510="http://schemas.microsoft.com/office/powerpoint/2015/10/main">
   <p1510:revLst>
-    <p1510:client id="{E03E74EA-EF3B-43B4-9B17-52CA29A38D90}" v="16" dt="2024-09-17T14:19:54.486"/>
+    <p1510:client id="{E03E74EA-EF3B-43B4-9B17-52CA29A38D90}" v="20" dt="2024-09-18T13:20:35.380"/>
   </p1510:revLst>
 </p1510:revInfo>
 </file>
@@ -583,7 +583,7 @@
   <pc:docChgLst>
     <pc:chgData name="Philippe Baucour" userId="5102170ae7533958" providerId="LiveId" clId="{E03E74EA-EF3B-43B4-9B17-52CA29A38D90}"/>
     <pc:docChg chg="undo custSel addSld delSld modSld sldOrd">
-      <pc:chgData name="Philippe Baucour" userId="5102170ae7533958" providerId="LiveId" clId="{E03E74EA-EF3B-43B4-9B17-52CA29A38D90}" dt="2024-09-17T14:53:30.962" v="2265"/>
+      <pc:chgData name="Philippe Baucour" userId="5102170ae7533958" providerId="LiveId" clId="{E03E74EA-EF3B-43B4-9B17-52CA29A38D90}" dt="2024-09-18T13:20:35.380" v="2446" actId="164"/>
       <pc:docMkLst>
         <pc:docMk/>
       </pc:docMkLst>
@@ -610,8 +610,8 @@
           </ac:spMkLst>
         </pc:spChg>
       </pc:sldChg>
-      <pc:sldChg chg="addSp modSp mod modAnim modNotesTx">
-        <pc:chgData name="Philippe Baucour" userId="5102170ae7533958" providerId="LiveId" clId="{E03E74EA-EF3B-43B4-9B17-52CA29A38D90}" dt="2024-09-17T13:40:34.789" v="1758" actId="207"/>
+      <pc:sldChg chg="addSp delSp modSp mod modAnim modNotesTx">
+        <pc:chgData name="Philippe Baucour" userId="5102170ae7533958" providerId="LiveId" clId="{E03E74EA-EF3B-43B4-9B17-52CA29A38D90}" dt="2024-09-18T13:20:35.380" v="2446" actId="164"/>
         <pc:sldMkLst>
           <pc:docMk/>
           <pc:sldMk cId="3201622378" sldId="257"/>
@@ -625,59 +625,83 @@
           </ac:spMkLst>
         </pc:spChg>
         <pc:spChg chg="add mod">
-          <ac:chgData name="Philippe Baucour" userId="5102170ae7533958" providerId="LiveId" clId="{E03E74EA-EF3B-43B4-9B17-52CA29A38D90}" dt="2024-09-17T06:41:11.479" v="1692" actId="1036"/>
+          <ac:chgData name="Philippe Baucour" userId="5102170ae7533958" providerId="LiveId" clId="{E03E74EA-EF3B-43B4-9B17-52CA29A38D90}" dt="2024-09-18T13:20:35.380" v="2446" actId="164"/>
           <ac:spMkLst>
             <pc:docMk/>
             <pc:sldMk cId="3201622378" sldId="257"/>
             <ac:spMk id="4" creationId="{1CB0633A-7E79-7F40-25D1-114C6B1444C7}"/>
           </ac:spMkLst>
         </pc:spChg>
-        <pc:spChg chg="mod">
-          <ac:chgData name="Philippe Baucour" userId="5102170ae7533958" providerId="LiveId" clId="{E03E74EA-EF3B-43B4-9B17-52CA29A38D90}" dt="2024-09-17T13:39:43.981" v="1756" actId="207"/>
+        <pc:spChg chg="mod topLvl">
+          <ac:chgData name="Philippe Baucour" userId="5102170ae7533958" providerId="LiveId" clId="{E03E74EA-EF3B-43B4-9B17-52CA29A38D90}" dt="2024-09-18T13:19:48.105" v="2405" actId="164"/>
           <ac:spMkLst>
             <pc:docMk/>
             <pc:sldMk cId="3201622378" sldId="257"/>
             <ac:spMk id="6" creationId="{452CC63D-3BBA-3175-4D69-47738F3F29AD}"/>
           </ac:spMkLst>
         </pc:spChg>
-        <pc:spChg chg="mod">
-          <ac:chgData name="Philippe Baucour" userId="5102170ae7533958" providerId="LiveId" clId="{E03E74EA-EF3B-43B4-9B17-52CA29A38D90}" dt="2024-09-17T13:36:04.426" v="1754"/>
+        <pc:spChg chg="mod topLvl">
+          <ac:chgData name="Philippe Baucour" userId="5102170ae7533958" providerId="LiveId" clId="{E03E74EA-EF3B-43B4-9B17-52CA29A38D90}" dt="2024-09-18T13:19:48.105" v="2405" actId="164"/>
           <ac:spMkLst>
             <pc:docMk/>
             <pc:sldMk cId="3201622378" sldId="257"/>
             <ac:spMk id="7" creationId="{CD3A35DC-88D7-A3EF-FBF7-FE5B87B742A8}"/>
           </ac:spMkLst>
         </pc:spChg>
-        <pc:spChg chg="mod">
-          <ac:chgData name="Philippe Baucour" userId="5102170ae7533958" providerId="LiveId" clId="{E03E74EA-EF3B-43B4-9B17-52CA29A38D90}" dt="2024-09-17T13:40:19.198" v="1757" actId="207"/>
+        <pc:spChg chg="mod topLvl">
+          <ac:chgData name="Philippe Baucour" userId="5102170ae7533958" providerId="LiveId" clId="{E03E74EA-EF3B-43B4-9B17-52CA29A38D90}" dt="2024-09-18T13:19:48.105" v="2405" actId="164"/>
           <ac:spMkLst>
             <pc:docMk/>
             <pc:sldMk cId="3201622378" sldId="257"/>
             <ac:spMk id="8" creationId="{CF0F7D9C-9002-475C-F827-83C1E0CE8EA9}"/>
           </ac:spMkLst>
         </pc:spChg>
-        <pc:spChg chg="mod">
-          <ac:chgData name="Philippe Baucour" userId="5102170ae7533958" providerId="LiveId" clId="{E03E74EA-EF3B-43B4-9B17-52CA29A38D90}" dt="2024-09-17T13:36:04.426" v="1754"/>
+        <pc:spChg chg="mod topLvl">
+          <ac:chgData name="Philippe Baucour" userId="5102170ae7533958" providerId="LiveId" clId="{E03E74EA-EF3B-43B4-9B17-52CA29A38D90}" dt="2024-09-18T13:19:48.105" v="2405" actId="164"/>
           <ac:spMkLst>
             <pc:docMk/>
             <pc:sldMk cId="3201622378" sldId="257"/>
             <ac:spMk id="9" creationId="{01D4FDA3-B3CF-D582-0365-F10997D76625}"/>
           </ac:spMkLst>
         </pc:spChg>
-        <pc:spChg chg="mod">
-          <ac:chgData name="Philippe Baucour" userId="5102170ae7533958" providerId="LiveId" clId="{E03E74EA-EF3B-43B4-9B17-52CA29A38D90}" dt="2024-09-17T13:40:34.789" v="1758" actId="207"/>
+        <pc:spChg chg="mod topLvl">
+          <ac:chgData name="Philippe Baucour" userId="5102170ae7533958" providerId="LiveId" clId="{E03E74EA-EF3B-43B4-9B17-52CA29A38D90}" dt="2024-09-18T13:19:48.105" v="2405" actId="164"/>
           <ac:spMkLst>
             <pc:docMk/>
             <pc:sldMk cId="3201622378" sldId="257"/>
             <ac:spMk id="10" creationId="{725E149A-555C-6062-2656-24AECCCC0790}"/>
           </ac:spMkLst>
         </pc:spChg>
-        <pc:grpChg chg="add mod">
-          <ac:chgData name="Philippe Baucour" userId="5102170ae7533958" providerId="LiveId" clId="{E03E74EA-EF3B-43B4-9B17-52CA29A38D90}" dt="2024-09-17T13:36:11.288" v="1755" actId="1076"/>
+        <pc:spChg chg="add mod">
+          <ac:chgData name="Philippe Baucour" userId="5102170ae7533958" providerId="LiveId" clId="{E03E74EA-EF3B-43B4-9B17-52CA29A38D90}" dt="2024-09-18T13:19:48.105" v="2405" actId="164"/>
+          <ac:spMkLst>
+            <pc:docMk/>
+            <pc:sldMk cId="3201622378" sldId="257"/>
+            <ac:spMk id="11" creationId="{D0051A72-F177-5F31-8797-C53F4BC5AA20}"/>
+          </ac:spMkLst>
+        </pc:spChg>
+        <pc:grpChg chg="add del mod">
+          <ac:chgData name="Philippe Baucour" userId="5102170ae7533958" providerId="LiveId" clId="{E03E74EA-EF3B-43B4-9B17-52CA29A38D90}" dt="2024-09-18T13:19:26.218" v="2402" actId="165"/>
           <ac:grpSpMkLst>
             <pc:docMk/>
             <pc:sldMk cId="3201622378" sldId="257"/>
             <ac:grpSpMk id="5" creationId="{1F7DA58F-CACE-B4F2-936D-0C00F91DDAD5}"/>
+          </ac:grpSpMkLst>
+        </pc:grpChg>
+        <pc:grpChg chg="add mod">
+          <ac:chgData name="Philippe Baucour" userId="5102170ae7533958" providerId="LiveId" clId="{E03E74EA-EF3B-43B4-9B17-52CA29A38D90}" dt="2024-09-18T13:20:35.380" v="2446" actId="164"/>
+          <ac:grpSpMkLst>
+            <pc:docMk/>
+            <pc:sldMk cId="3201622378" sldId="257"/>
+            <ac:grpSpMk id="12" creationId="{C9EF6054-1610-2CDD-FADD-4219E1A7275E}"/>
+          </ac:grpSpMkLst>
+        </pc:grpChg>
+        <pc:grpChg chg="add mod">
+          <ac:chgData name="Philippe Baucour" userId="5102170ae7533958" providerId="LiveId" clId="{E03E74EA-EF3B-43B4-9B17-52CA29A38D90}" dt="2024-09-18T13:20:35.380" v="2446" actId="164"/>
+          <ac:grpSpMkLst>
+            <pc:docMk/>
+            <pc:sldMk cId="3201622378" sldId="257"/>
+            <ac:grpSpMk id="13" creationId="{EEFE3618-A184-10F8-B439-6F9626C561A3}"/>
           </ac:grpSpMkLst>
         </pc:grpChg>
       </pc:sldChg>
@@ -937,7 +961,7 @@
         </pc:picChg>
       </pc:sldChg>
       <pc:sldChg chg="addSp delSp modSp new mod modClrScheme chgLayout modNotesTx">
-        <pc:chgData name="Philippe Baucour" userId="5102170ae7533958" providerId="LiveId" clId="{E03E74EA-EF3B-43B4-9B17-52CA29A38D90}" dt="2024-08-21T15:36:16.135" v="1355" actId="700"/>
+        <pc:chgData name="Philippe Baucour" userId="5102170ae7533958" providerId="LiveId" clId="{E03E74EA-EF3B-43B4-9B17-52CA29A38D90}" dt="2024-09-18T12:50:01.379" v="2316" actId="313"/>
         <pc:sldMkLst>
           <pc:docMk/>
           <pc:sldMk cId="1360386902" sldId="267"/>
@@ -2144,7 +2168,7 @@
           <a:p>
             <a:fld id="{FD1752CD-A7D2-4825-BC26-9DAEFBD0A5FF}" type="datetimeFigureOut">
               <a:rPr lang="fr-FR" smtClean="0"/>
-              <a:t>17/09/2024</a:t>
+              <a:t>18/09/2024</a:t>
             </a:fld>
             <a:endParaRPr lang="fr-FR"/>
           </a:p>
@@ -3650,6 +3674,69 @@
           <a:lstStyle/>
           <a:p>
             <a:r>
+              <a:rPr lang="fr-FR" sz="1800" dirty="0">
+                <a:effectLst/>
+                <a:latin typeface="Courier New" panose="02070309020205020404" pitchFamily="49" charset="0"/>
+              </a:rPr>
+              <a:t>La régularisation Lasso ajoute, à la fonction de coût, une pénalité proportionnelle à la </a:t>
+            </a:r>
+            <a:r>
+              <a:rPr lang="fr-FR" sz="1800" b="1" dirty="0">
+                <a:effectLst/>
+                <a:latin typeface="Courier New" panose="02070309020205020404" pitchFamily="49" charset="0"/>
+              </a:rPr>
+              <a:t>valeur absolue des coefficients</a:t>
+            </a:r>
+            <a:r>
+              <a:rPr lang="fr-FR" sz="1800" dirty="0">
+                <a:effectLst/>
+                <a:latin typeface="Courier New" panose="02070309020205020404" pitchFamily="49" charset="0"/>
+              </a:rPr>
+              <a:t> du modèle. Favorise la sélection de caractéristiques importantes et conduit à une certaine </a:t>
+            </a:r>
+            <a:r>
+              <a:rPr lang="fr-FR" sz="1800" dirty="0" err="1">
+                <a:effectLst/>
+                <a:latin typeface="Courier New" panose="02070309020205020404" pitchFamily="49" charset="0"/>
+              </a:rPr>
+              <a:t>sparsité</a:t>
+            </a:r>
+            <a:r>
+              <a:rPr lang="fr-FR" sz="1800" dirty="0">
+                <a:effectLst/>
+                <a:latin typeface="Courier New" panose="02070309020205020404" pitchFamily="49" charset="0"/>
+              </a:rPr>
+              <a:t> (certains coefficients à 0)</a:t>
+            </a:r>
+          </a:p>
+          <a:p>
+            <a:r>
+              <a:rPr lang="fr-FR" sz="1800" dirty="0">
+                <a:effectLst/>
+                <a:latin typeface="Courier New" panose="02070309020205020404" pitchFamily="49" charset="0"/>
+              </a:rPr>
+              <a:t>La régularisation Ridge utilise une pénalité proportionnelle au </a:t>
+            </a:r>
+            <a:r>
+              <a:rPr lang="fr-FR" sz="1800" b="1" dirty="0">
+                <a:effectLst/>
+                <a:latin typeface="Courier New" panose="02070309020205020404" pitchFamily="49" charset="0"/>
+              </a:rPr>
+              <a:t>carré des coefficients</a:t>
+            </a:r>
+            <a:r>
+              <a:rPr lang="fr-FR" sz="1800" dirty="0">
+                <a:effectLst/>
+                <a:latin typeface="Courier New" panose="02070309020205020404" pitchFamily="49" charset="0"/>
+              </a:rPr>
+              <a:t>, ce qui réduit la magnitude des coefficients sans les éliminer complètement.</a:t>
+            </a:r>
+          </a:p>
+          <a:p>
+            <a:endParaRPr lang="fr-FR" dirty="0"/>
+          </a:p>
+          <a:p>
+            <a:r>
               <a:rPr lang="fr-FR" dirty="0"/>
               <a:t>Use </a:t>
             </a:r>
@@ -3843,84 +3930,43 @@
           <a:p>
             <a:r>
               <a:rPr lang="en-US" dirty="0"/>
-              <a:t>EDA		: The recipe</a:t>
+              <a:t>EDA 		: The recipe </a:t>
             </a:r>
           </a:p>
           <a:p>
             <a:r>
               <a:rPr lang="en-US" dirty="0"/>
-              <a:t>Features Engineering	: The secret sauce</a:t>
+              <a:t>Features Engineering 	: The secret sauce </a:t>
             </a:r>
           </a:p>
           <a:p>
             <a:r>
               <a:rPr lang="en-US" dirty="0"/>
-              <a:t>Baseline model	: The first taste</a:t>
+              <a:t>Baseline model 	: The first taste </a:t>
             </a:r>
           </a:p>
           <a:p>
             <a:r>
               <a:rPr lang="en-US" dirty="0"/>
-              <a:t>Metrics Analysis	: The critics' score</a:t>
+              <a:t>Metrics Analysis 	: The critics' score </a:t>
             </a:r>
           </a:p>
           <a:p>
             <a:r>
               <a:rPr lang="en-US" dirty="0"/>
-              <a:t>API &amp; App		: Sharing with friends</a:t>
-            </a:r>
-          </a:p>
-          <a:p>
-            <a:endParaRPr lang="en-US" dirty="0"/>
-          </a:p>
-          <a:p>
-            <a:endParaRPr lang="en-US" dirty="0"/>
+              <a:t>API &amp; App 		: Sharing with friends </a:t>
+            </a:r>
           </a:p>
           <a:p>
             <a:r>
               <a:rPr lang="en-US" dirty="0"/>
-              <a:t>Don't mess with EDA     	: Never</a:t>
+              <a:t>Deployment &amp; Monitoring	: Serve the dish, maintain quality</a:t>
             </a:r>
           </a:p>
           <a:p>
             <a:r>
               <a:rPr lang="en-US" dirty="0"/>
-              <a:t>Feature engineering	: Smarter</a:t>
-            </a:r>
-          </a:p>
-          <a:p>
-            <a:r>
-              <a:rPr lang="en-US" dirty="0"/>
-              <a:t>Get a baseline model    	: Faster</a:t>
-            </a:r>
-          </a:p>
-          <a:p>
-            <a:r>
-              <a:rPr lang="en-US" dirty="0"/>
-              <a:t>Metrics analysis        	: Always</a:t>
-            </a:r>
-          </a:p>
-          <a:p>
-            <a:pPr marL="0" marR="0" lvl="0" indent="0" algn="l" defTabSz="914400" rtl="0" eaLnBrk="1" fontAlgn="auto" latinLnBrk="0" hangingPunct="1">
-              <a:lnSpc>
-                <a:spcPct val="100000"/>
-              </a:lnSpc>
-              <a:spcBef>
-                <a:spcPts val="0"/>
-              </a:spcBef>
-              <a:spcAft>
-                <a:spcPts val="0"/>
-              </a:spcAft>
-              <a:buClrTx/>
-              <a:buSzTx/>
-              <a:buFontTx/>
-              <a:buNone/>
-              <a:tabLst/>
-              <a:defRPr/>
-            </a:pPr>
-            <a:r>
-              <a:rPr lang="en-US" dirty="0"/>
-              <a:t>API &amp; App		: </a:t>
+              <a:t> </a:t>
             </a:r>
           </a:p>
         </p:txBody>
@@ -4108,7 +4154,7 @@
           <a:p>
             <a:fld id="{7ECB9D5A-E5E4-41FE-AF39-634902D6D5D2}" type="datetimeFigureOut">
               <a:rPr lang="fr-FR" smtClean="0"/>
-              <a:t>17/09/2024</a:t>
+              <a:t>18/09/2024</a:t>
             </a:fld>
             <a:endParaRPr lang="fr-FR"/>
           </a:p>
@@ -4306,7 +4352,7 @@
           <a:p>
             <a:fld id="{7ECB9D5A-E5E4-41FE-AF39-634902D6D5D2}" type="datetimeFigureOut">
               <a:rPr lang="fr-FR" smtClean="0"/>
-              <a:t>17/09/2024</a:t>
+              <a:t>18/09/2024</a:t>
             </a:fld>
             <a:endParaRPr lang="fr-FR"/>
           </a:p>
@@ -4514,7 +4560,7 @@
           <a:p>
             <a:fld id="{7ECB9D5A-E5E4-41FE-AF39-634902D6D5D2}" type="datetimeFigureOut">
               <a:rPr lang="fr-FR" smtClean="0"/>
-              <a:t>17/09/2024</a:t>
+              <a:t>18/09/2024</a:t>
             </a:fld>
             <a:endParaRPr lang="fr-FR"/>
           </a:p>
@@ -4712,7 +4758,7 @@
           <a:p>
             <a:fld id="{7ECB9D5A-E5E4-41FE-AF39-634902D6D5D2}" type="datetimeFigureOut">
               <a:rPr lang="fr-FR" smtClean="0"/>
-              <a:t>17/09/2024</a:t>
+              <a:t>18/09/2024</a:t>
             </a:fld>
             <a:endParaRPr lang="fr-FR"/>
           </a:p>
@@ -4987,7 +5033,7 @@
           <a:p>
             <a:fld id="{7ECB9D5A-E5E4-41FE-AF39-634902D6D5D2}" type="datetimeFigureOut">
               <a:rPr lang="fr-FR" smtClean="0"/>
-              <a:t>17/09/2024</a:t>
+              <a:t>18/09/2024</a:t>
             </a:fld>
             <a:endParaRPr lang="fr-FR"/>
           </a:p>
@@ -5252,7 +5298,7 @@
           <a:p>
             <a:fld id="{7ECB9D5A-E5E4-41FE-AF39-634902D6D5D2}" type="datetimeFigureOut">
               <a:rPr lang="fr-FR" smtClean="0"/>
-              <a:t>17/09/2024</a:t>
+              <a:t>18/09/2024</a:t>
             </a:fld>
             <a:endParaRPr lang="fr-FR"/>
           </a:p>
@@ -5664,7 +5710,7 @@
           <a:p>
             <a:fld id="{7ECB9D5A-E5E4-41FE-AF39-634902D6D5D2}" type="datetimeFigureOut">
               <a:rPr lang="fr-FR" smtClean="0"/>
-              <a:t>17/09/2024</a:t>
+              <a:t>18/09/2024</a:t>
             </a:fld>
             <a:endParaRPr lang="fr-FR"/>
           </a:p>
@@ -5805,7 +5851,7 @@
           <a:p>
             <a:fld id="{7ECB9D5A-E5E4-41FE-AF39-634902D6D5D2}" type="datetimeFigureOut">
               <a:rPr lang="fr-FR" smtClean="0"/>
-              <a:t>17/09/2024</a:t>
+              <a:t>18/09/2024</a:t>
             </a:fld>
             <a:endParaRPr lang="fr-FR"/>
           </a:p>
@@ -5918,7 +5964,7 @@
           <a:p>
             <a:fld id="{7ECB9D5A-E5E4-41FE-AF39-634902D6D5D2}" type="datetimeFigureOut">
               <a:rPr lang="fr-FR" smtClean="0"/>
-              <a:t>17/09/2024</a:t>
+              <a:t>18/09/2024</a:t>
             </a:fld>
             <a:endParaRPr lang="fr-FR"/>
           </a:p>
@@ -6229,7 +6275,7 @@
           <a:p>
             <a:fld id="{7ECB9D5A-E5E4-41FE-AF39-634902D6D5D2}" type="datetimeFigureOut">
               <a:rPr lang="fr-FR" smtClean="0"/>
-              <a:t>17/09/2024</a:t>
+              <a:t>18/09/2024</a:t>
             </a:fld>
             <a:endParaRPr lang="fr-FR"/>
           </a:p>
@@ -6520,7 +6566,7 @@
           <a:p>
             <a:fld id="{7ECB9D5A-E5E4-41FE-AF39-634902D6D5D2}" type="datetimeFigureOut">
               <a:rPr lang="fr-FR" smtClean="0"/>
-              <a:t>17/09/2024</a:t>
+              <a:t>18/09/2024</a:t>
             </a:fld>
             <a:endParaRPr lang="fr-FR"/>
           </a:p>
@@ -6761,7 +6807,7 @@
           <a:p>
             <a:fld id="{7ECB9D5A-E5E4-41FE-AF39-634902D6D5D2}" type="datetimeFigureOut">
               <a:rPr lang="fr-FR" smtClean="0"/>
-              <a:t>17/09/2024</a:t>
+              <a:t>18/09/2024</a:t>
             </a:fld>
             <a:endParaRPr lang="fr-FR"/>
           </a:p>
@@ -7455,123 +7501,12 @@
           </a:p>
         </p:txBody>
       </p:sp>
-      <p:sp>
-        <p:nvSpPr>
-          <p:cNvPr id="4" name="ZoneTexte 3">
+      <p:grpSp>
+        <p:nvGrpSpPr>
+          <p:cNvPr id="13" name="Groupe 12">
             <a:extLst>
               <a:ext uri="{FF2B5EF4-FFF2-40B4-BE49-F238E27FC236}">
-                <a16:creationId xmlns:a16="http://schemas.microsoft.com/office/drawing/2014/main" id="{1CB0633A-7E79-7F40-25D1-114C6B1444C7}"/>
-              </a:ext>
-            </a:extLst>
-          </p:cNvPr>
-          <p:cNvSpPr txBox="1"/>
-          <p:nvPr/>
-        </p:nvSpPr>
-        <p:spPr>
-          <a:xfrm>
-            <a:off x="7701187" y="146966"/>
-            <a:ext cx="4277453" cy="1477328"/>
-          </a:xfrm>
-          <a:prstGeom prst="rect">
-            <a:avLst/>
-          </a:prstGeom>
-          <a:solidFill>
-            <a:schemeClr val="accent4">
-              <a:lumMod val="20000"/>
-              <a:lumOff val="80000"/>
-            </a:schemeClr>
-          </a:solidFill>
-          <a:effectLst>
-            <a:outerShdw blurRad="50800" dist="38100" dir="2700000" algn="tl" rotWithShape="0">
-              <a:prstClr val="black">
-                <a:alpha val="40000"/>
-              </a:prstClr>
-            </a:outerShdw>
-          </a:effectLst>
-        </p:spPr>
-        <p:txBody>
-          <a:bodyPr wrap="none" rtlCol="0">
-            <a:spAutoFit/>
-          </a:bodyPr>
-          <a:lstStyle/>
-          <a:p>
-            <a:pPr>
-              <a:tabLst>
-                <a:tab pos="2065338" algn="l"/>
-              </a:tabLst>
-            </a:pPr>
-            <a:r>
-              <a:rPr lang="en-US" dirty="0">
-                <a:latin typeface="Times New Roman" panose="02020603050405020304" pitchFamily="18" charset="0"/>
-                <a:cs typeface="Times New Roman" panose="02020603050405020304" pitchFamily="18" charset="0"/>
-              </a:rPr>
-              <a:t>EDA	: The recipe</a:t>
-            </a:r>
-          </a:p>
-          <a:p>
-            <a:pPr>
-              <a:tabLst>
-                <a:tab pos="2065338" algn="l"/>
-              </a:tabLst>
-            </a:pPr>
-            <a:r>
-              <a:rPr lang="en-US" dirty="0">
-                <a:latin typeface="Times New Roman" panose="02020603050405020304" pitchFamily="18" charset="0"/>
-                <a:cs typeface="Times New Roman" panose="02020603050405020304" pitchFamily="18" charset="0"/>
-              </a:rPr>
-              <a:t>Features Engineering	: The secret sauce</a:t>
-            </a:r>
-          </a:p>
-          <a:p>
-            <a:pPr>
-              <a:tabLst>
-                <a:tab pos="2065338" algn="l"/>
-              </a:tabLst>
-            </a:pPr>
-            <a:r>
-              <a:rPr lang="en-US" dirty="0">
-                <a:latin typeface="Times New Roman" panose="02020603050405020304" pitchFamily="18" charset="0"/>
-                <a:cs typeface="Times New Roman" panose="02020603050405020304" pitchFamily="18" charset="0"/>
-              </a:rPr>
-              <a:t>Baseline model	: The first taste</a:t>
-            </a:r>
-          </a:p>
-          <a:p>
-            <a:pPr>
-              <a:tabLst>
-                <a:tab pos="2065338" algn="l"/>
-              </a:tabLst>
-            </a:pPr>
-            <a:r>
-              <a:rPr lang="en-US" dirty="0">
-                <a:latin typeface="Times New Roman" panose="02020603050405020304" pitchFamily="18" charset="0"/>
-                <a:cs typeface="Times New Roman" panose="02020603050405020304" pitchFamily="18" charset="0"/>
-              </a:rPr>
-              <a:t>Metrics Analysis	: The critics' score</a:t>
-            </a:r>
-          </a:p>
-          <a:p>
-            <a:pPr>
-              <a:tabLst>
-                <a:tab pos="2065338" algn="l"/>
-              </a:tabLst>
-            </a:pPr>
-            <a:r>
-              <a:rPr lang="en-US" dirty="0">
-                <a:latin typeface="Times New Roman" panose="02020603050405020304" pitchFamily="18" charset="0"/>
-                <a:cs typeface="Times New Roman" panose="02020603050405020304" pitchFamily="18" charset="0"/>
-              </a:rPr>
-              <a:t>API &amp; App	: Sharing with friends</a:t>
-            </a:r>
-          </a:p>
-        </p:txBody>
-      </p:sp>
-      <p:grpSp>
-        <p:nvGrpSpPr>
-          <p:cNvPr id="5" name="Groupe 4">
-            <a:extLst>
-              <a:ext uri="{FF2B5EF4-FFF2-40B4-BE49-F238E27FC236}">
-                <a16:creationId xmlns:a16="http://schemas.microsoft.com/office/drawing/2014/main" id="{1F7DA58F-CACE-B4F2-936D-0C00F91DDAD5}"/>
+                <a16:creationId xmlns:a16="http://schemas.microsoft.com/office/drawing/2014/main" id="{EEFE3618-A184-10F8-B439-6F9626C561A3}"/>
               </a:ext>
             </a:extLst>
           </p:cNvPr>
@@ -7580,272 +7515,470 @@
         </p:nvGrpSpPr>
         <p:grpSpPr>
           <a:xfrm>
-            <a:off x="7462232" y="258948"/>
-            <a:ext cx="180000" cy="1253363"/>
-            <a:chOff x="7486295" y="3676973"/>
-            <a:chExt cx="180000" cy="1253363"/>
+            <a:off x="6158008" y="146966"/>
+            <a:ext cx="5820632" cy="1754326"/>
+            <a:chOff x="6158008" y="146966"/>
+            <a:chExt cx="5820632" cy="1754326"/>
           </a:xfrm>
         </p:grpSpPr>
         <p:sp>
           <p:nvSpPr>
-            <p:cNvPr id="6" name="Ellipse 5">
+            <p:cNvPr id="4" name="ZoneTexte 3">
               <a:extLst>
                 <a:ext uri="{FF2B5EF4-FFF2-40B4-BE49-F238E27FC236}">
-                  <a16:creationId xmlns:a16="http://schemas.microsoft.com/office/drawing/2014/main" id="{452CC63D-3BBA-3175-4D69-47738F3F29AD}"/>
+                  <a16:creationId xmlns:a16="http://schemas.microsoft.com/office/drawing/2014/main" id="{1CB0633A-7E79-7F40-25D1-114C6B1444C7}"/>
                 </a:ext>
               </a:extLst>
             </p:cNvPr>
-            <p:cNvSpPr/>
+            <p:cNvSpPr txBox="1"/>
             <p:nvPr/>
           </p:nvSpPr>
           <p:spPr>
             <a:xfrm>
-              <a:off x="7486295" y="3676973"/>
-              <a:ext cx="180000" cy="180000"/>
+              <a:off x="6396964" y="146966"/>
+              <a:ext cx="5581676" cy="1754326"/>
             </a:xfrm>
-            <a:prstGeom prst="ellipse">
+            <a:prstGeom prst="rect">
               <a:avLst/>
             </a:prstGeom>
             <a:solidFill>
-              <a:srgbClr val="92D050"/>
+              <a:schemeClr val="accent4">
+                <a:lumMod val="20000"/>
+                <a:lumOff val="80000"/>
+              </a:schemeClr>
             </a:solidFill>
-            <a:ln>
-              <a:noFill/>
-            </a:ln>
+            <a:effectLst>
+              <a:outerShdw blurRad="50800" dist="38100" dir="2700000" algn="tl" rotWithShape="0">
+                <a:prstClr val="black">
+                  <a:alpha val="40000"/>
+                </a:prstClr>
+              </a:outerShdw>
+            </a:effectLst>
           </p:spPr>
-          <p:style>
-            <a:lnRef idx="2">
-              <a:schemeClr val="accent1">
-                <a:shade val="15000"/>
-              </a:schemeClr>
-            </a:lnRef>
-            <a:fillRef idx="1">
-              <a:schemeClr val="accent1"/>
-            </a:fillRef>
-            <a:effectRef idx="0">
-              <a:schemeClr val="accent1"/>
-            </a:effectRef>
-            <a:fontRef idx="minor">
-              <a:schemeClr val="lt1"/>
-            </a:fontRef>
-          </p:style>
           <p:txBody>
-            <a:bodyPr rtlCol="0" anchor="ctr"/>
+            <a:bodyPr wrap="square" rtlCol="0">
+              <a:spAutoFit/>
+            </a:bodyPr>
             <a:lstStyle/>
             <a:p>
-              <a:pPr algn="ctr"/>
-              <a:endParaRPr lang="fr-FR"/>
+              <a:pPr>
+                <a:tabLst>
+                  <a:tab pos="2333625" algn="l"/>
+                </a:tabLst>
+              </a:pPr>
+              <a:r>
+                <a:rPr lang="en-US" dirty="0">
+                  <a:latin typeface="Times New Roman" panose="02020603050405020304" pitchFamily="18" charset="0"/>
+                  <a:cs typeface="Times New Roman" panose="02020603050405020304" pitchFamily="18" charset="0"/>
+                </a:rPr>
+                <a:t>EDA	: The recipe</a:t>
+              </a:r>
+            </a:p>
+            <a:p>
+              <a:pPr>
+                <a:tabLst>
+                  <a:tab pos="2333625" algn="l"/>
+                </a:tabLst>
+              </a:pPr>
+              <a:r>
+                <a:rPr lang="en-US" dirty="0">
+                  <a:latin typeface="Times New Roman" panose="02020603050405020304" pitchFamily="18" charset="0"/>
+                  <a:cs typeface="Times New Roman" panose="02020603050405020304" pitchFamily="18" charset="0"/>
+                </a:rPr>
+                <a:t>Features Engineering	: The secret sauce</a:t>
+              </a:r>
+            </a:p>
+            <a:p>
+              <a:pPr>
+                <a:tabLst>
+                  <a:tab pos="2333625" algn="l"/>
+                </a:tabLst>
+              </a:pPr>
+              <a:r>
+                <a:rPr lang="en-US" dirty="0">
+                  <a:latin typeface="Times New Roman" panose="02020603050405020304" pitchFamily="18" charset="0"/>
+                  <a:cs typeface="Times New Roman" panose="02020603050405020304" pitchFamily="18" charset="0"/>
+                </a:rPr>
+                <a:t>Baseline model	: The first taste</a:t>
+              </a:r>
+            </a:p>
+            <a:p>
+              <a:pPr>
+                <a:tabLst>
+                  <a:tab pos="2333625" algn="l"/>
+                </a:tabLst>
+              </a:pPr>
+              <a:r>
+                <a:rPr lang="en-US" dirty="0">
+                  <a:latin typeface="Times New Roman" panose="02020603050405020304" pitchFamily="18" charset="0"/>
+                  <a:cs typeface="Times New Roman" panose="02020603050405020304" pitchFamily="18" charset="0"/>
+                </a:rPr>
+                <a:t>Metrics Analysis	: The critics' score</a:t>
+              </a:r>
+            </a:p>
+            <a:p>
+              <a:pPr>
+                <a:tabLst>
+                  <a:tab pos="2333625" algn="l"/>
+                </a:tabLst>
+              </a:pPr>
+              <a:r>
+                <a:rPr lang="en-US" dirty="0">
+                  <a:latin typeface="Times New Roman" panose="02020603050405020304" pitchFamily="18" charset="0"/>
+                  <a:cs typeface="Times New Roman" panose="02020603050405020304" pitchFamily="18" charset="0"/>
+                </a:rPr>
+                <a:t>API &amp; App	: Sharing with friends</a:t>
+              </a:r>
+            </a:p>
+            <a:p>
+              <a:pPr>
+                <a:tabLst>
+                  <a:tab pos="2333625" algn="l"/>
+                </a:tabLst>
+              </a:pPr>
+              <a:r>
+                <a:rPr lang="en-US" dirty="0">
+                  <a:latin typeface="Times New Roman" panose="02020603050405020304" pitchFamily="18" charset="0"/>
+                  <a:cs typeface="Times New Roman" panose="02020603050405020304" pitchFamily="18" charset="0"/>
+                </a:rPr>
+                <a:t>Deployment Monitoring	: Serve the dish, maintain quality</a:t>
+              </a:r>
             </a:p>
           </p:txBody>
         </p:sp>
-        <p:sp>
-          <p:nvSpPr>
-            <p:cNvPr id="7" name="Ellipse 6">
+        <p:grpSp>
+          <p:nvGrpSpPr>
+            <p:cNvPr id="12" name="Groupe 11">
               <a:extLst>
                 <a:ext uri="{FF2B5EF4-FFF2-40B4-BE49-F238E27FC236}">
-                  <a16:creationId xmlns:a16="http://schemas.microsoft.com/office/drawing/2014/main" id="{CD3A35DC-88D7-A3EF-FBF7-FE5B87B742A8}"/>
+                  <a16:creationId xmlns:a16="http://schemas.microsoft.com/office/drawing/2014/main" id="{C9EF6054-1610-2CDD-FADD-4219E1A7275E}"/>
                 </a:ext>
               </a:extLst>
             </p:cNvPr>
-            <p:cNvSpPr/>
+            <p:cNvGrpSpPr/>
             <p:nvPr/>
-          </p:nvSpPr>
-          <p:spPr>
+          </p:nvGrpSpPr>
+          <p:grpSpPr>
             <a:xfrm>
-              <a:off x="7486295" y="3945314"/>
-              <a:ext cx="180000" cy="180000"/>
+              <a:off x="6158008" y="258948"/>
+              <a:ext cx="180000" cy="1547663"/>
+              <a:chOff x="7462232" y="258948"/>
+              <a:chExt cx="180000" cy="1547663"/>
             </a:xfrm>
-            <a:prstGeom prst="ellipse">
-              <a:avLst/>
-            </a:prstGeom>
-            <a:solidFill>
-              <a:srgbClr val="92D050"/>
-            </a:solidFill>
-            <a:ln>
-              <a:noFill/>
-            </a:ln>
-          </p:spPr>
-          <p:style>
-            <a:lnRef idx="2">
-              <a:schemeClr val="accent1">
-                <a:shade val="15000"/>
-              </a:schemeClr>
-            </a:lnRef>
-            <a:fillRef idx="1">
-              <a:schemeClr val="accent1"/>
-            </a:fillRef>
-            <a:effectRef idx="0">
-              <a:schemeClr val="accent1"/>
-            </a:effectRef>
-            <a:fontRef idx="minor">
-              <a:schemeClr val="lt1"/>
-            </a:fontRef>
-          </p:style>
-          <p:txBody>
-            <a:bodyPr rtlCol="0" anchor="ctr"/>
-            <a:lstStyle/>
-            <a:p>
-              <a:pPr algn="ctr"/>
-              <a:endParaRPr lang="fr-FR"/>
-            </a:p>
-          </p:txBody>
-        </p:sp>
-        <p:sp>
-          <p:nvSpPr>
-            <p:cNvPr id="8" name="Ellipse 7">
-              <a:extLst>
-                <a:ext uri="{FF2B5EF4-FFF2-40B4-BE49-F238E27FC236}">
-                  <a16:creationId xmlns:a16="http://schemas.microsoft.com/office/drawing/2014/main" id="{CF0F7D9C-9002-475C-F827-83C1E0CE8EA9}"/>
-                </a:ext>
-              </a:extLst>
-            </p:cNvPr>
-            <p:cNvSpPr/>
-            <p:nvPr/>
-          </p:nvSpPr>
-          <p:spPr>
-            <a:xfrm>
-              <a:off x="7486295" y="4213655"/>
-              <a:ext cx="180000" cy="180000"/>
-            </a:xfrm>
-            <a:prstGeom prst="ellipse">
-              <a:avLst/>
-            </a:prstGeom>
-            <a:solidFill>
-              <a:srgbClr val="92D050"/>
-            </a:solidFill>
-            <a:ln>
-              <a:noFill/>
-            </a:ln>
-          </p:spPr>
-          <p:style>
-            <a:lnRef idx="2">
-              <a:schemeClr val="accent1">
-                <a:shade val="15000"/>
-              </a:schemeClr>
-            </a:lnRef>
-            <a:fillRef idx="1">
-              <a:schemeClr val="accent1"/>
-            </a:fillRef>
-            <a:effectRef idx="0">
-              <a:schemeClr val="accent1"/>
-            </a:effectRef>
-            <a:fontRef idx="minor">
-              <a:schemeClr val="lt1"/>
-            </a:fontRef>
-          </p:style>
-          <p:txBody>
-            <a:bodyPr rtlCol="0" anchor="ctr"/>
-            <a:lstStyle/>
-            <a:p>
-              <a:pPr algn="ctr"/>
-              <a:endParaRPr lang="fr-FR"/>
-            </a:p>
-          </p:txBody>
-        </p:sp>
-        <p:sp>
-          <p:nvSpPr>
-            <p:cNvPr id="9" name="Ellipse 8">
-              <a:extLst>
-                <a:ext uri="{FF2B5EF4-FFF2-40B4-BE49-F238E27FC236}">
-                  <a16:creationId xmlns:a16="http://schemas.microsoft.com/office/drawing/2014/main" id="{01D4FDA3-B3CF-D582-0365-F10997D76625}"/>
-                </a:ext>
-              </a:extLst>
-            </p:cNvPr>
-            <p:cNvSpPr/>
-            <p:nvPr/>
-          </p:nvSpPr>
-          <p:spPr>
-            <a:xfrm>
-              <a:off x="7486295" y="4481996"/>
-              <a:ext cx="180000" cy="180000"/>
-            </a:xfrm>
-            <a:prstGeom prst="ellipse">
-              <a:avLst/>
-            </a:prstGeom>
-            <a:solidFill>
-              <a:srgbClr val="92D050"/>
-            </a:solidFill>
-            <a:ln>
-              <a:noFill/>
-            </a:ln>
-          </p:spPr>
-          <p:style>
-            <a:lnRef idx="2">
-              <a:schemeClr val="accent1">
-                <a:shade val="15000"/>
-              </a:schemeClr>
-            </a:lnRef>
-            <a:fillRef idx="1">
-              <a:schemeClr val="accent1"/>
-            </a:fillRef>
-            <a:effectRef idx="0">
-              <a:schemeClr val="accent1"/>
-            </a:effectRef>
-            <a:fontRef idx="minor">
-              <a:schemeClr val="lt1"/>
-            </a:fontRef>
-          </p:style>
-          <p:txBody>
-            <a:bodyPr rtlCol="0" anchor="ctr"/>
-            <a:lstStyle/>
-            <a:p>
-              <a:pPr algn="ctr"/>
-              <a:endParaRPr lang="fr-FR"/>
-            </a:p>
-          </p:txBody>
-        </p:sp>
-        <p:sp>
-          <p:nvSpPr>
-            <p:cNvPr id="10" name="Ellipse 9">
-              <a:extLst>
-                <a:ext uri="{FF2B5EF4-FFF2-40B4-BE49-F238E27FC236}">
-                  <a16:creationId xmlns:a16="http://schemas.microsoft.com/office/drawing/2014/main" id="{725E149A-555C-6062-2656-24AECCCC0790}"/>
-                </a:ext>
-              </a:extLst>
-            </p:cNvPr>
-            <p:cNvSpPr/>
-            <p:nvPr/>
-          </p:nvSpPr>
-          <p:spPr>
-            <a:xfrm>
-              <a:off x="7486295" y="4750336"/>
-              <a:ext cx="180000" cy="180000"/>
-            </a:xfrm>
-            <a:prstGeom prst="ellipse">
-              <a:avLst/>
-            </a:prstGeom>
-            <a:solidFill>
-              <a:srgbClr val="C00000"/>
-            </a:solidFill>
-            <a:ln>
-              <a:noFill/>
-            </a:ln>
-          </p:spPr>
-          <p:style>
-            <a:lnRef idx="2">
-              <a:schemeClr val="accent1">
-                <a:shade val="15000"/>
-              </a:schemeClr>
-            </a:lnRef>
-            <a:fillRef idx="1">
-              <a:schemeClr val="accent1"/>
-            </a:fillRef>
-            <a:effectRef idx="0">
-              <a:schemeClr val="accent1"/>
-            </a:effectRef>
-            <a:fontRef idx="minor">
-              <a:schemeClr val="lt1"/>
-            </a:fontRef>
-          </p:style>
-          <p:txBody>
-            <a:bodyPr rtlCol="0" anchor="ctr"/>
-            <a:lstStyle/>
-            <a:p>
-              <a:pPr algn="ctr"/>
-              <a:endParaRPr lang="fr-FR"/>
-            </a:p>
-          </p:txBody>
-        </p:sp>
+          </p:grpSpPr>
+          <p:sp>
+            <p:nvSpPr>
+              <p:cNvPr id="6" name="Ellipse 5">
+                <a:extLst>
+                  <a:ext uri="{FF2B5EF4-FFF2-40B4-BE49-F238E27FC236}">
+                    <a16:creationId xmlns:a16="http://schemas.microsoft.com/office/drawing/2014/main" id="{452CC63D-3BBA-3175-4D69-47738F3F29AD}"/>
+                  </a:ext>
+                </a:extLst>
+              </p:cNvPr>
+              <p:cNvSpPr/>
+              <p:nvPr/>
+            </p:nvSpPr>
+            <p:spPr>
+              <a:xfrm>
+                <a:off x="7462232" y="258948"/>
+                <a:ext cx="180000" cy="180000"/>
+              </a:xfrm>
+              <a:prstGeom prst="ellipse">
+                <a:avLst/>
+              </a:prstGeom>
+              <a:solidFill>
+                <a:srgbClr val="92D050"/>
+              </a:solidFill>
+              <a:ln>
+                <a:noFill/>
+              </a:ln>
+            </p:spPr>
+            <p:style>
+              <a:lnRef idx="2">
+                <a:schemeClr val="accent1">
+                  <a:shade val="15000"/>
+                </a:schemeClr>
+              </a:lnRef>
+              <a:fillRef idx="1">
+                <a:schemeClr val="accent1"/>
+              </a:fillRef>
+              <a:effectRef idx="0">
+                <a:schemeClr val="accent1"/>
+              </a:effectRef>
+              <a:fontRef idx="minor">
+                <a:schemeClr val="lt1"/>
+              </a:fontRef>
+            </p:style>
+            <p:txBody>
+              <a:bodyPr rtlCol="0" anchor="ctr"/>
+              <a:lstStyle/>
+              <a:p>
+                <a:pPr algn="ctr"/>
+                <a:endParaRPr lang="fr-FR"/>
+              </a:p>
+            </p:txBody>
+          </p:sp>
+          <p:sp>
+            <p:nvSpPr>
+              <p:cNvPr id="7" name="Ellipse 6">
+                <a:extLst>
+                  <a:ext uri="{FF2B5EF4-FFF2-40B4-BE49-F238E27FC236}">
+                    <a16:creationId xmlns:a16="http://schemas.microsoft.com/office/drawing/2014/main" id="{CD3A35DC-88D7-A3EF-FBF7-FE5B87B742A8}"/>
+                  </a:ext>
+                </a:extLst>
+              </p:cNvPr>
+              <p:cNvSpPr/>
+              <p:nvPr/>
+            </p:nvSpPr>
+            <p:spPr>
+              <a:xfrm>
+                <a:off x="7462232" y="527289"/>
+                <a:ext cx="180000" cy="180000"/>
+              </a:xfrm>
+              <a:prstGeom prst="ellipse">
+                <a:avLst/>
+              </a:prstGeom>
+              <a:solidFill>
+                <a:srgbClr val="92D050"/>
+              </a:solidFill>
+              <a:ln>
+                <a:noFill/>
+              </a:ln>
+            </p:spPr>
+            <p:style>
+              <a:lnRef idx="2">
+                <a:schemeClr val="accent1">
+                  <a:shade val="15000"/>
+                </a:schemeClr>
+              </a:lnRef>
+              <a:fillRef idx="1">
+                <a:schemeClr val="accent1"/>
+              </a:fillRef>
+              <a:effectRef idx="0">
+                <a:schemeClr val="accent1"/>
+              </a:effectRef>
+              <a:fontRef idx="minor">
+                <a:schemeClr val="lt1"/>
+              </a:fontRef>
+            </p:style>
+            <p:txBody>
+              <a:bodyPr rtlCol="0" anchor="ctr"/>
+              <a:lstStyle/>
+              <a:p>
+                <a:pPr algn="ctr"/>
+                <a:endParaRPr lang="fr-FR"/>
+              </a:p>
+            </p:txBody>
+          </p:sp>
+          <p:sp>
+            <p:nvSpPr>
+              <p:cNvPr id="8" name="Ellipse 7">
+                <a:extLst>
+                  <a:ext uri="{FF2B5EF4-FFF2-40B4-BE49-F238E27FC236}">
+                    <a16:creationId xmlns:a16="http://schemas.microsoft.com/office/drawing/2014/main" id="{CF0F7D9C-9002-475C-F827-83C1E0CE8EA9}"/>
+                  </a:ext>
+                </a:extLst>
+              </p:cNvPr>
+              <p:cNvSpPr/>
+              <p:nvPr/>
+            </p:nvSpPr>
+            <p:spPr>
+              <a:xfrm>
+                <a:off x="7462232" y="795630"/>
+                <a:ext cx="180000" cy="180000"/>
+              </a:xfrm>
+              <a:prstGeom prst="ellipse">
+                <a:avLst/>
+              </a:prstGeom>
+              <a:solidFill>
+                <a:srgbClr val="92D050"/>
+              </a:solidFill>
+              <a:ln>
+                <a:noFill/>
+              </a:ln>
+            </p:spPr>
+            <p:style>
+              <a:lnRef idx="2">
+                <a:schemeClr val="accent1">
+                  <a:shade val="15000"/>
+                </a:schemeClr>
+              </a:lnRef>
+              <a:fillRef idx="1">
+                <a:schemeClr val="accent1"/>
+              </a:fillRef>
+              <a:effectRef idx="0">
+                <a:schemeClr val="accent1"/>
+              </a:effectRef>
+              <a:fontRef idx="minor">
+                <a:schemeClr val="lt1"/>
+              </a:fontRef>
+            </p:style>
+            <p:txBody>
+              <a:bodyPr rtlCol="0" anchor="ctr"/>
+              <a:lstStyle/>
+              <a:p>
+                <a:pPr algn="ctr"/>
+                <a:endParaRPr lang="fr-FR"/>
+              </a:p>
+            </p:txBody>
+          </p:sp>
+          <p:sp>
+            <p:nvSpPr>
+              <p:cNvPr id="9" name="Ellipse 8">
+                <a:extLst>
+                  <a:ext uri="{FF2B5EF4-FFF2-40B4-BE49-F238E27FC236}">
+                    <a16:creationId xmlns:a16="http://schemas.microsoft.com/office/drawing/2014/main" id="{01D4FDA3-B3CF-D582-0365-F10997D76625}"/>
+                  </a:ext>
+                </a:extLst>
+              </p:cNvPr>
+              <p:cNvSpPr/>
+              <p:nvPr/>
+            </p:nvSpPr>
+            <p:spPr>
+              <a:xfrm>
+                <a:off x="7462232" y="1063971"/>
+                <a:ext cx="180000" cy="180000"/>
+              </a:xfrm>
+              <a:prstGeom prst="ellipse">
+                <a:avLst/>
+              </a:prstGeom>
+              <a:solidFill>
+                <a:srgbClr val="92D050"/>
+              </a:solidFill>
+              <a:ln>
+                <a:noFill/>
+              </a:ln>
+            </p:spPr>
+            <p:style>
+              <a:lnRef idx="2">
+                <a:schemeClr val="accent1">
+                  <a:shade val="15000"/>
+                </a:schemeClr>
+              </a:lnRef>
+              <a:fillRef idx="1">
+                <a:schemeClr val="accent1"/>
+              </a:fillRef>
+              <a:effectRef idx="0">
+                <a:schemeClr val="accent1"/>
+              </a:effectRef>
+              <a:fontRef idx="minor">
+                <a:schemeClr val="lt1"/>
+              </a:fontRef>
+            </p:style>
+            <p:txBody>
+              <a:bodyPr rtlCol="0" anchor="ctr"/>
+              <a:lstStyle/>
+              <a:p>
+                <a:pPr algn="ctr"/>
+                <a:endParaRPr lang="fr-FR"/>
+              </a:p>
+            </p:txBody>
+          </p:sp>
+          <p:sp>
+            <p:nvSpPr>
+              <p:cNvPr id="10" name="Ellipse 9">
+                <a:extLst>
+                  <a:ext uri="{FF2B5EF4-FFF2-40B4-BE49-F238E27FC236}">
+                    <a16:creationId xmlns:a16="http://schemas.microsoft.com/office/drawing/2014/main" id="{725E149A-555C-6062-2656-24AECCCC0790}"/>
+                  </a:ext>
+                </a:extLst>
+              </p:cNvPr>
+              <p:cNvSpPr/>
+              <p:nvPr/>
+            </p:nvSpPr>
+            <p:spPr>
+              <a:xfrm>
+                <a:off x="7462232" y="1332311"/>
+                <a:ext cx="180000" cy="180000"/>
+              </a:xfrm>
+              <a:prstGeom prst="ellipse">
+                <a:avLst/>
+              </a:prstGeom>
+              <a:solidFill>
+                <a:srgbClr val="C00000"/>
+              </a:solidFill>
+              <a:ln>
+                <a:noFill/>
+              </a:ln>
+            </p:spPr>
+            <p:style>
+              <a:lnRef idx="2">
+                <a:schemeClr val="accent1">
+                  <a:shade val="15000"/>
+                </a:schemeClr>
+              </a:lnRef>
+              <a:fillRef idx="1">
+                <a:schemeClr val="accent1"/>
+              </a:fillRef>
+              <a:effectRef idx="0">
+                <a:schemeClr val="accent1"/>
+              </a:effectRef>
+              <a:fontRef idx="minor">
+                <a:schemeClr val="lt1"/>
+              </a:fontRef>
+            </p:style>
+            <p:txBody>
+              <a:bodyPr rtlCol="0" anchor="ctr"/>
+              <a:lstStyle/>
+              <a:p>
+                <a:pPr algn="ctr"/>
+                <a:endParaRPr lang="fr-FR"/>
+              </a:p>
+            </p:txBody>
+          </p:sp>
+          <p:sp>
+            <p:nvSpPr>
+              <p:cNvPr id="11" name="Ellipse 10">
+                <a:extLst>
+                  <a:ext uri="{FF2B5EF4-FFF2-40B4-BE49-F238E27FC236}">
+                    <a16:creationId xmlns:a16="http://schemas.microsoft.com/office/drawing/2014/main" id="{D0051A72-F177-5F31-8797-C53F4BC5AA20}"/>
+                  </a:ext>
+                </a:extLst>
+              </p:cNvPr>
+              <p:cNvSpPr/>
+              <p:nvPr/>
+            </p:nvSpPr>
+            <p:spPr>
+              <a:xfrm>
+                <a:off x="7462232" y="1626611"/>
+                <a:ext cx="180000" cy="180000"/>
+              </a:xfrm>
+              <a:prstGeom prst="ellipse">
+                <a:avLst/>
+              </a:prstGeom>
+              <a:solidFill>
+                <a:srgbClr val="C00000"/>
+              </a:solidFill>
+              <a:ln>
+                <a:noFill/>
+              </a:ln>
+            </p:spPr>
+            <p:style>
+              <a:lnRef idx="2">
+                <a:schemeClr val="accent1">
+                  <a:shade val="15000"/>
+                </a:schemeClr>
+              </a:lnRef>
+              <a:fillRef idx="1">
+                <a:schemeClr val="accent1"/>
+              </a:fillRef>
+              <a:effectRef idx="0">
+                <a:schemeClr val="accent1"/>
+              </a:effectRef>
+              <a:fontRef idx="minor">
+                <a:schemeClr val="lt1"/>
+              </a:fontRef>
+            </p:style>
+            <p:txBody>
+              <a:bodyPr rtlCol="0" anchor="ctr"/>
+              <a:lstStyle/>
+              <a:p>
+                <a:pPr algn="ctr"/>
+                <a:endParaRPr lang="fr-FR"/>
+              </a:p>
+            </p:txBody>
+          </p:sp>
+        </p:grpSp>
       </p:grpSp>
     </p:spTree>
     <p:extLst>

</xml_diff>